<commit_message>
picking ucpu & reg
</commit_message>
<xml_diff>
--- a/design.pptx
+++ b/design.pptx
@@ -259,7 +259,7 @@
           <a:p>
             <a:fld id="{24FD6ABC-FBB2-4D10-81CB-3943CF222665}" type="datetimeFigureOut">
               <a:rPr lang="en-US" smtClean="0"/>
-              <a:t>3/13/2023</a:t>
+              <a:t>3/21/2023</a:t>
             </a:fld>
             <a:endParaRPr lang="en-US"/>
           </a:p>
@@ -457,7 +457,7 @@
           <a:p>
             <a:fld id="{24FD6ABC-FBB2-4D10-81CB-3943CF222665}" type="datetimeFigureOut">
               <a:rPr lang="en-US" smtClean="0"/>
-              <a:t>3/13/2023</a:t>
+              <a:t>3/21/2023</a:t>
             </a:fld>
             <a:endParaRPr lang="en-US"/>
           </a:p>
@@ -665,7 +665,7 @@
           <a:p>
             <a:fld id="{24FD6ABC-FBB2-4D10-81CB-3943CF222665}" type="datetimeFigureOut">
               <a:rPr lang="en-US" smtClean="0"/>
-              <a:t>3/13/2023</a:t>
+              <a:t>3/21/2023</a:t>
             </a:fld>
             <a:endParaRPr lang="en-US"/>
           </a:p>
@@ -863,7 +863,7 @@
           <a:p>
             <a:fld id="{24FD6ABC-FBB2-4D10-81CB-3943CF222665}" type="datetimeFigureOut">
               <a:rPr lang="en-US" smtClean="0"/>
-              <a:t>3/13/2023</a:t>
+              <a:t>3/21/2023</a:t>
             </a:fld>
             <a:endParaRPr lang="en-US"/>
           </a:p>
@@ -1138,7 +1138,7 @@
           <a:p>
             <a:fld id="{24FD6ABC-FBB2-4D10-81CB-3943CF222665}" type="datetimeFigureOut">
               <a:rPr lang="en-US" smtClean="0"/>
-              <a:t>3/13/2023</a:t>
+              <a:t>3/21/2023</a:t>
             </a:fld>
             <a:endParaRPr lang="en-US"/>
           </a:p>
@@ -1403,7 +1403,7 @@
           <a:p>
             <a:fld id="{24FD6ABC-FBB2-4D10-81CB-3943CF222665}" type="datetimeFigureOut">
               <a:rPr lang="en-US" smtClean="0"/>
-              <a:t>3/13/2023</a:t>
+              <a:t>3/21/2023</a:t>
             </a:fld>
             <a:endParaRPr lang="en-US"/>
           </a:p>
@@ -1815,7 +1815,7 @@
           <a:p>
             <a:fld id="{24FD6ABC-FBB2-4D10-81CB-3943CF222665}" type="datetimeFigureOut">
               <a:rPr lang="en-US" smtClean="0"/>
-              <a:t>3/13/2023</a:t>
+              <a:t>3/21/2023</a:t>
             </a:fld>
             <a:endParaRPr lang="en-US"/>
           </a:p>
@@ -1956,7 +1956,7 @@
           <a:p>
             <a:fld id="{24FD6ABC-FBB2-4D10-81CB-3943CF222665}" type="datetimeFigureOut">
               <a:rPr lang="en-US" smtClean="0"/>
-              <a:t>3/13/2023</a:t>
+              <a:t>3/21/2023</a:t>
             </a:fld>
             <a:endParaRPr lang="en-US"/>
           </a:p>
@@ -2069,7 +2069,7 @@
           <a:p>
             <a:fld id="{24FD6ABC-FBB2-4D10-81CB-3943CF222665}" type="datetimeFigureOut">
               <a:rPr lang="en-US" smtClean="0"/>
-              <a:t>3/13/2023</a:t>
+              <a:t>3/21/2023</a:t>
             </a:fld>
             <a:endParaRPr lang="en-US"/>
           </a:p>
@@ -2380,7 +2380,7 @@
           <a:p>
             <a:fld id="{24FD6ABC-FBB2-4D10-81CB-3943CF222665}" type="datetimeFigureOut">
               <a:rPr lang="en-US" smtClean="0"/>
-              <a:t>3/13/2023</a:t>
+              <a:t>3/21/2023</a:t>
             </a:fld>
             <a:endParaRPr lang="en-US"/>
           </a:p>
@@ -2668,7 +2668,7 @@
           <a:p>
             <a:fld id="{24FD6ABC-FBB2-4D10-81CB-3943CF222665}" type="datetimeFigureOut">
               <a:rPr lang="en-US" smtClean="0"/>
-              <a:t>3/13/2023</a:t>
+              <a:t>3/21/2023</a:t>
             </a:fld>
             <a:endParaRPr lang="en-US"/>
           </a:p>
@@ -2909,7 +2909,7 @@
           <a:p>
             <a:fld id="{24FD6ABC-FBB2-4D10-81CB-3943CF222665}" type="datetimeFigureOut">
               <a:rPr lang="en-US" smtClean="0"/>
-              <a:t>3/13/2023</a:t>
+              <a:t>3/21/2023</a:t>
             </a:fld>
             <a:endParaRPr lang="en-US"/>
           </a:p>
@@ -3340,8 +3340,8 @@
         </p:nvSpPr>
         <p:spPr>
           <a:xfrm>
-            <a:off x="2087418" y="722376"/>
-            <a:ext cx="6724073" cy="5521406"/>
+            <a:off x="2087418" y="230446"/>
+            <a:ext cx="7879542" cy="6013336"/>
           </a:xfrm>
           <a:prstGeom prst="rect">
             <a:avLst/>
@@ -3686,14 +3686,14 @@
             <a:pPr algn="ctr"/>
             <a:r>
               <a:rPr lang="en-US" sz="1400" dirty="0"/>
-              <a:t>STM32F302R8</a:t>
+              <a:t>STM32 ARM CPU</a:t>
             </a:r>
           </a:p>
           <a:p>
             <a:pPr algn="ctr"/>
             <a:r>
               <a:rPr lang="en-US" sz="1400" dirty="0"/>
-              <a:t>ARM CPU</a:t>
+              <a:t>STM32L4XXX</a:t>
             </a:r>
           </a:p>
         </p:txBody>
@@ -3761,7 +3761,7 @@
         </p:nvSpPr>
         <p:spPr>
           <a:xfrm>
-            <a:off x="6858092" y="2318188"/>
+            <a:off x="5952716" y="1918423"/>
             <a:ext cx="1133856" cy="307777"/>
           </a:xfrm>
           <a:prstGeom prst="rect">
@@ -3915,7 +3915,7 @@
         </p:nvSpPr>
         <p:spPr>
           <a:xfrm>
-            <a:off x="6858092" y="1030979"/>
+            <a:off x="7473597" y="689121"/>
             <a:ext cx="1133856" cy="307777"/>
           </a:xfrm>
           <a:prstGeom prst="rect">
@@ -3964,8 +3964,8 @@
         </p:nvSpPr>
         <p:spPr>
           <a:xfrm>
-            <a:off x="6858092" y="1533021"/>
-            <a:ext cx="1133856" cy="307777"/>
+            <a:off x="5862584" y="1285575"/>
+            <a:ext cx="1333183" cy="307777"/>
           </a:xfrm>
           <a:prstGeom prst="rect">
             <a:avLst/>
@@ -3994,7 +3994,7 @@
             <a:pPr algn="ctr"/>
             <a:r>
               <a:rPr lang="en-US" sz="1400" dirty="0"/>
-              <a:t>Regulator</a:t>
+              <a:t>LDO Regulator</a:t>
             </a:r>
           </a:p>
         </p:txBody>
@@ -4013,8 +4013,8 @@
         </p:nvSpPr>
         <p:spPr>
           <a:xfrm>
-            <a:off x="2642060" y="1533021"/>
-            <a:ext cx="3450983" cy="307777"/>
+            <a:off x="2495551" y="1285575"/>
+            <a:ext cx="2818195" cy="307777"/>
           </a:xfrm>
           <a:prstGeom prst="rect">
             <a:avLst/>
@@ -4043,53 +4043,11 @@
             <a:pPr algn="ctr"/>
             <a:r>
               <a:rPr lang="en-US" sz="1400" dirty="0"/>
-              <a:t>3.3V Power BUS</a:t>
-            </a:r>
-          </a:p>
-        </p:txBody>
-      </p:sp>
-      <p:cxnSp>
-        <p:nvCxnSpPr>
-          <p:cNvPr id="22" name="Straight Arrow Connector 21">
-            <a:extLst>
-              <a:ext uri="{FF2B5EF4-FFF2-40B4-BE49-F238E27FC236}">
-                <a16:creationId xmlns:a16="http://schemas.microsoft.com/office/drawing/2014/main" id="{E2D6E1B7-1555-A48A-9462-5BA9E912B4C5}"/>
-              </a:ext>
-            </a:extLst>
-          </p:cNvPr>
-          <p:cNvCxnSpPr>
-            <a:stCxn id="18" idx="2"/>
-            <a:endCxn id="19" idx="0"/>
-          </p:cNvCxnSpPr>
-          <p:nvPr/>
-        </p:nvCxnSpPr>
-        <p:spPr>
-          <a:xfrm>
-            <a:off x="7425020" y="1338756"/>
-            <a:ext cx="0" cy="194265"/>
-          </a:xfrm>
-          <a:prstGeom prst="straightConnector1">
-            <a:avLst/>
-          </a:prstGeom>
-          <a:ln>
-            <a:tailEnd type="triangle"/>
-          </a:ln>
-        </p:spPr>
-        <p:style>
-          <a:lnRef idx="1">
-            <a:schemeClr val="accent1"/>
-          </a:lnRef>
-          <a:fillRef idx="0">
-            <a:schemeClr val="accent1"/>
-          </a:fillRef>
-          <a:effectRef idx="0">
-            <a:schemeClr val="accent1"/>
-          </a:effectRef>
-          <a:fontRef idx="minor">
-            <a:schemeClr val="tx1"/>
-          </a:fontRef>
-        </p:style>
-      </p:cxnSp>
+              <a:t>1.8V Power BUS</a:t>
+            </a:r>
+          </a:p>
+        </p:txBody>
+      </p:sp>
       <p:cxnSp>
         <p:nvCxnSpPr>
           <p:cNvPr id="24" name="Straight Arrow Connector 23">
@@ -4108,8 +4066,8 @@
         </p:nvCxnSpPr>
         <p:spPr>
           <a:xfrm flipH="1">
-            <a:off x="6093043" y="1686910"/>
-            <a:ext cx="765049" cy="0"/>
+            <a:off x="5313746" y="1439464"/>
+            <a:ext cx="548838" cy="0"/>
           </a:xfrm>
           <a:prstGeom prst="straightConnector1">
             <a:avLst/>
@@ -4185,15 +4143,16 @@
             </a:extLst>
           </p:cNvPr>
           <p:cNvCxnSpPr>
+            <a:cxnSpLocks/>
             <a:stCxn id="19" idx="2"/>
             <a:endCxn id="10" idx="0"/>
           </p:cNvCxnSpPr>
           <p:nvPr/>
         </p:nvCxnSpPr>
         <p:spPr>
-          <a:xfrm>
-            <a:off x="7425020" y="1840798"/>
-            <a:ext cx="0" cy="477390"/>
+          <a:xfrm flipH="1">
+            <a:off x="6519644" y="1593352"/>
+            <a:ext cx="9532" cy="325071"/>
           </a:xfrm>
           <a:prstGeom prst="straightConnector1">
             <a:avLst/>
@@ -4668,6 +4627,422 @@
           </a:p>
         </p:txBody>
       </p:sp>
+      <p:sp>
+        <p:nvSpPr>
+          <p:cNvPr id="11" name="TextBox 10">
+            <a:extLst>
+              <a:ext uri="{FF2B5EF4-FFF2-40B4-BE49-F238E27FC236}">
+                <a16:creationId xmlns:a16="http://schemas.microsoft.com/office/drawing/2014/main" id="{4FDE725B-35D5-42A7-0E72-38274B0F66A8}"/>
+              </a:ext>
+            </a:extLst>
+          </p:cNvPr>
+          <p:cNvSpPr txBox="1"/>
+          <p:nvPr/>
+        </p:nvSpPr>
+        <p:spPr>
+          <a:xfrm>
+            <a:off x="3322568" y="6319777"/>
+            <a:ext cx="4928616" cy="307777"/>
+          </a:xfrm>
+          <a:prstGeom prst="rect">
+            <a:avLst/>
+          </a:prstGeom>
+          <a:noFill/>
+        </p:spPr>
+        <p:txBody>
+          <a:bodyPr wrap="square" rtlCol="0">
+            <a:spAutoFit/>
+          </a:bodyPr>
+          <a:lstStyle/>
+          <a:p>
+            <a:r>
+              <a:rPr lang="en-US" sz="1400" dirty="0">
+                <a:hlinkClick r:id="rId2"/>
+              </a:rPr>
+              <a:t>Mini Photocell - SEN-09088 - </a:t>
+            </a:r>
+            <a:r>
+              <a:rPr lang="en-US" sz="1400" dirty="0" err="1">
+                <a:hlinkClick r:id="rId2"/>
+              </a:rPr>
+              <a:t>SparkFun</a:t>
+            </a:r>
+            <a:r>
+              <a:rPr lang="en-US" sz="1400" dirty="0">
+                <a:hlinkClick r:id="rId2"/>
+              </a:rPr>
+              <a:t> Electronics</a:t>
+            </a:r>
+            <a:endParaRPr lang="en-US" sz="1400" dirty="0"/>
+          </a:p>
+        </p:txBody>
+      </p:sp>
+      <p:sp>
+        <p:nvSpPr>
+          <p:cNvPr id="12" name="TextBox 11">
+            <a:extLst>
+              <a:ext uri="{FF2B5EF4-FFF2-40B4-BE49-F238E27FC236}">
+                <a16:creationId xmlns:a16="http://schemas.microsoft.com/office/drawing/2014/main" id="{9657F4CE-6791-900C-3C9F-481DCAFDC22D}"/>
+              </a:ext>
+            </a:extLst>
+          </p:cNvPr>
+          <p:cNvSpPr txBox="1"/>
+          <p:nvPr/>
+        </p:nvSpPr>
+        <p:spPr>
+          <a:xfrm>
+            <a:off x="4367551" y="5912539"/>
+            <a:ext cx="2572745" cy="307777"/>
+          </a:xfrm>
+          <a:prstGeom prst="rect">
+            <a:avLst/>
+          </a:prstGeom>
+          <a:noFill/>
+        </p:spPr>
+        <p:txBody>
+          <a:bodyPr wrap="square" rtlCol="0">
+            <a:spAutoFit/>
+          </a:bodyPr>
+          <a:lstStyle/>
+          <a:p>
+            <a:r>
+              <a:rPr lang="en-US" sz="1400" dirty="0"/>
+              <a:t>SEN-09088 (or similar)</a:t>
+            </a:r>
+          </a:p>
+        </p:txBody>
+      </p:sp>
+      <p:sp>
+        <p:nvSpPr>
+          <p:cNvPr id="14" name="TextBox 13">
+            <a:extLst>
+              <a:ext uri="{FF2B5EF4-FFF2-40B4-BE49-F238E27FC236}">
+                <a16:creationId xmlns:a16="http://schemas.microsoft.com/office/drawing/2014/main" id="{7D87B7D7-990B-BFF3-D152-9B2C2843298B}"/>
+              </a:ext>
+            </a:extLst>
+          </p:cNvPr>
+          <p:cNvSpPr txBox="1"/>
+          <p:nvPr/>
+        </p:nvSpPr>
+        <p:spPr>
+          <a:xfrm>
+            <a:off x="3227485" y="2664239"/>
+            <a:ext cx="2033399" cy="461665"/>
+          </a:xfrm>
+          <a:prstGeom prst="rect">
+            <a:avLst/>
+          </a:prstGeom>
+          <a:noFill/>
+        </p:spPr>
+        <p:txBody>
+          <a:bodyPr wrap="square" rtlCol="0">
+            <a:spAutoFit/>
+          </a:bodyPr>
+          <a:lstStyle/>
+          <a:p>
+            <a:r>
+              <a:rPr lang="en-US" sz="1200" dirty="0" err="1"/>
+              <a:t>Everlight</a:t>
+            </a:r>
+            <a:r>
+              <a:rPr lang="en-US" sz="1200" dirty="0"/>
+              <a:t> Elec (Blue)</a:t>
+            </a:r>
+          </a:p>
+          <a:p>
+            <a:r>
+              <a:rPr lang="en-US" sz="1200" dirty="0"/>
+              <a:t>19-217/BHC-ZL1M2RY/3T</a:t>
+            </a:r>
+          </a:p>
+        </p:txBody>
+      </p:sp>
+      <p:sp>
+        <p:nvSpPr>
+          <p:cNvPr id="16" name="TextBox 15">
+            <a:extLst>
+              <a:ext uri="{FF2B5EF4-FFF2-40B4-BE49-F238E27FC236}">
+                <a16:creationId xmlns:a16="http://schemas.microsoft.com/office/drawing/2014/main" id="{989C3470-8579-482A-E0D9-34D2C27FDDF9}"/>
+              </a:ext>
+            </a:extLst>
+          </p:cNvPr>
+          <p:cNvSpPr txBox="1"/>
+          <p:nvPr/>
+        </p:nvSpPr>
+        <p:spPr>
+          <a:xfrm>
+            <a:off x="7134531" y="1855626"/>
+            <a:ext cx="2033399" cy="461665"/>
+          </a:xfrm>
+          <a:prstGeom prst="rect">
+            <a:avLst/>
+          </a:prstGeom>
+          <a:noFill/>
+        </p:spPr>
+        <p:txBody>
+          <a:bodyPr wrap="square" rtlCol="0">
+            <a:spAutoFit/>
+          </a:bodyPr>
+          <a:lstStyle/>
+          <a:p>
+            <a:r>
+              <a:rPr lang="en-US" sz="1200" dirty="0" err="1"/>
+              <a:t>Everlight</a:t>
+            </a:r>
+            <a:r>
+              <a:rPr lang="en-US" sz="1200" dirty="0"/>
+              <a:t> Elec (Green)</a:t>
+            </a:r>
+          </a:p>
+          <a:p>
+            <a:r>
+              <a:rPr lang="en-US" sz="1200" dirty="0"/>
+              <a:t>19-217/BHC-ZL1M2RY/3T</a:t>
+            </a:r>
+          </a:p>
+        </p:txBody>
+      </p:sp>
+      <p:sp>
+        <p:nvSpPr>
+          <p:cNvPr id="21" name="TextBox 20">
+            <a:extLst>
+              <a:ext uri="{FF2B5EF4-FFF2-40B4-BE49-F238E27FC236}">
+                <a16:creationId xmlns:a16="http://schemas.microsoft.com/office/drawing/2014/main" id="{7D2EB12D-590C-1F50-D84C-62F75B78FA6A}"/>
+              </a:ext>
+            </a:extLst>
+          </p:cNvPr>
+          <p:cNvSpPr txBox="1"/>
+          <p:nvPr/>
+        </p:nvSpPr>
+        <p:spPr>
+          <a:xfrm>
+            <a:off x="6473432" y="3429000"/>
+            <a:ext cx="1451441" cy="276999"/>
+          </a:xfrm>
+          <a:prstGeom prst="rect">
+            <a:avLst/>
+          </a:prstGeom>
+          <a:noFill/>
+        </p:spPr>
+        <p:txBody>
+          <a:bodyPr wrap="square" rtlCol="0">
+            <a:spAutoFit/>
+          </a:bodyPr>
+          <a:lstStyle/>
+          <a:p>
+            <a:r>
+              <a:rPr lang="en-US" sz="1200" dirty="0"/>
+              <a:t>STM32L431RCT6</a:t>
+            </a:r>
+          </a:p>
+        </p:txBody>
+      </p:sp>
+      <p:sp>
+        <p:nvSpPr>
+          <p:cNvPr id="33" name="TextBox 32">
+            <a:extLst>
+              <a:ext uri="{FF2B5EF4-FFF2-40B4-BE49-F238E27FC236}">
+                <a16:creationId xmlns:a16="http://schemas.microsoft.com/office/drawing/2014/main" id="{B811BE71-1EAA-E1C9-F2D6-E846B4D96E65}"/>
+              </a:ext>
+            </a:extLst>
+          </p:cNvPr>
+          <p:cNvSpPr txBox="1"/>
+          <p:nvPr/>
+        </p:nvSpPr>
+        <p:spPr>
+          <a:xfrm>
+            <a:off x="8607453" y="694858"/>
+            <a:ext cx="1415103" cy="276999"/>
+          </a:xfrm>
+          <a:prstGeom prst="rect">
+            <a:avLst/>
+          </a:prstGeom>
+          <a:noFill/>
+        </p:spPr>
+        <p:txBody>
+          <a:bodyPr wrap="square" rtlCol="0">
+            <a:spAutoFit/>
+          </a:bodyPr>
+          <a:lstStyle/>
+          <a:p>
+            <a:r>
+              <a:rPr lang="en-US" sz="1200" dirty="0"/>
+              <a:t>3V Coin Cell</a:t>
+            </a:r>
+          </a:p>
+        </p:txBody>
+      </p:sp>
+      <p:sp>
+        <p:nvSpPr>
+          <p:cNvPr id="35" name="TextBox 34">
+            <a:extLst>
+              <a:ext uri="{FF2B5EF4-FFF2-40B4-BE49-F238E27FC236}">
+                <a16:creationId xmlns:a16="http://schemas.microsoft.com/office/drawing/2014/main" id="{6FEAD58C-6F51-BEF7-BED3-F883C79340EB}"/>
+              </a:ext>
+            </a:extLst>
+          </p:cNvPr>
+          <p:cNvSpPr txBox="1"/>
+          <p:nvPr/>
+        </p:nvSpPr>
+        <p:spPr>
+          <a:xfrm>
+            <a:off x="7343866" y="1220656"/>
+            <a:ext cx="2527174" cy="461665"/>
+          </a:xfrm>
+          <a:prstGeom prst="rect">
+            <a:avLst/>
+          </a:prstGeom>
+          <a:noFill/>
+        </p:spPr>
+        <p:txBody>
+          <a:bodyPr wrap="square" rtlCol="0">
+            <a:spAutoFit/>
+          </a:bodyPr>
+          <a:lstStyle/>
+          <a:p>
+            <a:r>
+              <a:rPr lang="en-US" sz="1200" dirty="0"/>
+              <a:t>AP7380-18W5-7 (1.8V Ideal)</a:t>
+            </a:r>
+          </a:p>
+          <a:p>
+            <a:endParaRPr lang="en-US" sz="1200" dirty="0"/>
+          </a:p>
+        </p:txBody>
+      </p:sp>
+      <p:sp>
+        <p:nvSpPr>
+          <p:cNvPr id="46" name="Rectangle 45">
+            <a:extLst>
+              <a:ext uri="{FF2B5EF4-FFF2-40B4-BE49-F238E27FC236}">
+                <a16:creationId xmlns:a16="http://schemas.microsoft.com/office/drawing/2014/main" id="{342CB1D2-03B0-9DA2-199C-D7712CB1160A}"/>
+              </a:ext>
+            </a:extLst>
+          </p:cNvPr>
+          <p:cNvSpPr/>
+          <p:nvPr/>
+        </p:nvSpPr>
+        <p:spPr>
+          <a:xfrm>
+            <a:off x="5965755" y="687180"/>
+            <a:ext cx="1133856" cy="307777"/>
+          </a:xfrm>
+          <a:prstGeom prst="rect">
+            <a:avLst/>
+          </a:prstGeom>
+        </p:spPr>
+        <p:style>
+          <a:lnRef idx="2">
+            <a:schemeClr val="accent5">
+              <a:shade val="50000"/>
+            </a:schemeClr>
+          </a:lnRef>
+          <a:fillRef idx="1">
+            <a:schemeClr val="accent5"/>
+          </a:fillRef>
+          <a:effectRef idx="0">
+            <a:schemeClr val="accent5"/>
+          </a:effectRef>
+          <a:fontRef idx="minor">
+            <a:schemeClr val="lt1"/>
+          </a:fontRef>
+        </p:style>
+        <p:txBody>
+          <a:bodyPr rtlCol="0" anchor="ctr"/>
+          <a:lstStyle/>
+          <a:p>
+            <a:pPr algn="ctr"/>
+            <a:r>
+              <a:rPr lang="en-US" sz="1400" dirty="0"/>
+              <a:t>PWR Switch</a:t>
+            </a:r>
+          </a:p>
+        </p:txBody>
+      </p:sp>
+      <p:cxnSp>
+        <p:nvCxnSpPr>
+          <p:cNvPr id="55" name="Straight Arrow Connector 54">
+            <a:extLst>
+              <a:ext uri="{FF2B5EF4-FFF2-40B4-BE49-F238E27FC236}">
+                <a16:creationId xmlns:a16="http://schemas.microsoft.com/office/drawing/2014/main" id="{159B0DBA-F17A-78B9-453B-88A687ED965A}"/>
+              </a:ext>
+            </a:extLst>
+          </p:cNvPr>
+          <p:cNvCxnSpPr>
+            <a:stCxn id="18" idx="1"/>
+            <a:endCxn id="46" idx="3"/>
+          </p:cNvCxnSpPr>
+          <p:nvPr/>
+        </p:nvCxnSpPr>
+        <p:spPr>
+          <a:xfrm flipH="1" flipV="1">
+            <a:off x="7099611" y="841069"/>
+            <a:ext cx="373986" cy="1941"/>
+          </a:xfrm>
+          <a:prstGeom prst="straightConnector1">
+            <a:avLst/>
+          </a:prstGeom>
+          <a:ln>
+            <a:tailEnd type="triangle"/>
+          </a:ln>
+        </p:spPr>
+        <p:style>
+          <a:lnRef idx="1">
+            <a:schemeClr val="accent1"/>
+          </a:lnRef>
+          <a:fillRef idx="0">
+            <a:schemeClr val="accent1"/>
+          </a:fillRef>
+          <a:effectRef idx="0">
+            <a:schemeClr val="accent1"/>
+          </a:effectRef>
+          <a:fontRef idx="minor">
+            <a:schemeClr val="tx1"/>
+          </a:fontRef>
+        </p:style>
+      </p:cxnSp>
+      <p:cxnSp>
+        <p:nvCxnSpPr>
+          <p:cNvPr id="57" name="Straight Arrow Connector 56">
+            <a:extLst>
+              <a:ext uri="{FF2B5EF4-FFF2-40B4-BE49-F238E27FC236}">
+                <a16:creationId xmlns:a16="http://schemas.microsoft.com/office/drawing/2014/main" id="{5FC7620B-EB16-D070-2164-3F2758037E41}"/>
+              </a:ext>
+            </a:extLst>
+          </p:cNvPr>
+          <p:cNvCxnSpPr>
+            <a:stCxn id="46" idx="2"/>
+            <a:endCxn id="19" idx="0"/>
+          </p:cNvCxnSpPr>
+          <p:nvPr/>
+        </p:nvCxnSpPr>
+        <p:spPr>
+          <a:xfrm flipH="1">
+            <a:off x="6529176" y="994957"/>
+            <a:ext cx="3507" cy="290618"/>
+          </a:xfrm>
+          <a:prstGeom prst="straightConnector1">
+            <a:avLst/>
+          </a:prstGeom>
+          <a:ln>
+            <a:tailEnd type="triangle"/>
+          </a:ln>
+        </p:spPr>
+        <p:style>
+          <a:lnRef idx="1">
+            <a:schemeClr val="accent1"/>
+          </a:lnRef>
+          <a:fillRef idx="0">
+            <a:schemeClr val="accent1"/>
+          </a:fillRef>
+          <a:effectRef idx="0">
+            <a:schemeClr val="accent1"/>
+          </a:effectRef>
+          <a:fontRef idx="minor">
+            <a:schemeClr val="tx1"/>
+          </a:fontRef>
+        </p:style>
+      </p:cxnSp>
     </p:spTree>
     <p:extLst>
       <p:ext uri="{BB962C8B-B14F-4D97-AF65-F5344CB8AC3E}">

</xml_diff>

<commit_message>
Adding more information to device tree
</commit_message>
<xml_diff>
--- a/design.pptx
+++ b/design.pptx
@@ -3340,8 +3340,8 @@
         </p:nvSpPr>
         <p:spPr>
           <a:xfrm>
-            <a:off x="2087418" y="230446"/>
-            <a:ext cx="7879542" cy="6013336"/>
+            <a:off x="2087418" y="329184"/>
+            <a:ext cx="7879542" cy="5243241"/>
           </a:xfrm>
           <a:prstGeom prst="rect">
             <a:avLst/>
@@ -3656,7 +3656,7 @@
         </p:nvSpPr>
         <p:spPr>
           <a:xfrm>
-            <a:off x="4798787" y="3582888"/>
+            <a:off x="4798787" y="3509416"/>
             <a:ext cx="1545336" cy="931567"/>
           </a:xfrm>
           <a:prstGeom prst="rect">
@@ -3712,7 +3712,7 @@
         </p:nvSpPr>
         <p:spPr>
           <a:xfrm>
-            <a:off x="5004527" y="2772365"/>
+            <a:off x="5004527" y="2590843"/>
             <a:ext cx="1133856" cy="307777"/>
           </a:xfrm>
           <a:prstGeom prst="rect">
@@ -3761,7 +3761,7 @@
         </p:nvSpPr>
         <p:spPr>
           <a:xfrm>
-            <a:off x="5952716" y="1918423"/>
+            <a:off x="5966317" y="1879378"/>
             <a:ext cx="1133856" cy="307777"/>
           </a:xfrm>
           <a:prstGeom prst="rect">
@@ -3810,7 +3810,7 @@
         </p:nvSpPr>
         <p:spPr>
           <a:xfrm>
-            <a:off x="3954110" y="5358783"/>
+            <a:off x="3954110" y="4982647"/>
             <a:ext cx="3234690" cy="490797"/>
           </a:xfrm>
           <a:prstGeom prst="rect">
@@ -3866,8 +3866,8 @@
         </p:nvSpPr>
         <p:spPr>
           <a:xfrm>
-            <a:off x="2489598" y="3681132"/>
-            <a:ext cx="1133856" cy="735073"/>
+            <a:off x="2550252" y="3651256"/>
+            <a:ext cx="1133856" cy="647885"/>
           </a:xfrm>
           <a:prstGeom prst="rect">
             <a:avLst/>
@@ -3896,7 +3896,7 @@
             <a:pPr algn="ctr"/>
             <a:r>
               <a:rPr lang="en-US" sz="1400" dirty="0"/>
-              <a:t>MicroSD Card</a:t>
+              <a:t>FRAM</a:t>
             </a:r>
           </a:p>
         </p:txBody>
@@ -4043,7 +4043,7 @@
             <a:pPr algn="ctr"/>
             <a:r>
               <a:rPr lang="en-US" sz="1400" dirty="0"/>
-              <a:t>1.8V Power BUS</a:t>
+              <a:t>3.3V Power BUS</a:t>
             </a:r>
           </a:p>
         </p:txBody>
@@ -4108,8 +4108,8 @@
         </p:nvCxnSpPr>
         <p:spPr>
           <a:xfrm flipV="1">
-            <a:off x="5571455" y="4514455"/>
-            <a:ext cx="0" cy="844328"/>
+            <a:off x="5571455" y="4440983"/>
+            <a:ext cx="0" cy="541664"/>
           </a:xfrm>
           <a:prstGeom prst="straightConnector1">
             <a:avLst/>
@@ -4150,9 +4150,9 @@
           <p:nvPr/>
         </p:nvCxnSpPr>
         <p:spPr>
-          <a:xfrm flipH="1">
-            <a:off x="6519644" y="1593352"/>
-            <a:ext cx="9532" cy="325071"/>
+          <a:xfrm>
+            <a:off x="6529176" y="1593352"/>
+            <a:ext cx="4069" cy="286026"/>
           </a:xfrm>
           <a:prstGeom prst="straightConnector1">
             <a:avLst/>
@@ -4186,6 +4186,7 @@
             </a:extLst>
           </p:cNvPr>
           <p:cNvCxnSpPr>
+            <a:cxnSpLocks/>
             <a:stCxn id="8" idx="1"/>
             <a:endCxn id="15" idx="3"/>
           </p:cNvCxnSpPr>
@@ -4193,8 +4194,8 @@
         </p:nvCxnSpPr>
         <p:spPr>
           <a:xfrm flipH="1" flipV="1">
-            <a:off x="3623454" y="4048669"/>
-            <a:ext cx="1175333" cy="3"/>
+            <a:off x="3684108" y="3975199"/>
+            <a:ext cx="1114679" cy="1"/>
           </a:xfrm>
           <a:prstGeom prst="straightConnector1">
             <a:avLst/>
@@ -4286,8 +4287,8 @@
         </p:nvCxnSpPr>
         <p:spPr>
           <a:xfrm flipV="1">
-            <a:off x="5571455" y="3080142"/>
-            <a:ext cx="0" cy="502746"/>
+            <a:off x="5571455" y="2898620"/>
+            <a:ext cx="0" cy="610796"/>
           </a:xfrm>
           <a:prstGeom prst="straightConnector1">
             <a:avLst/>
@@ -4378,7 +4379,7 @@
         <p:spPr>
           <a:xfrm rot="10800000" flipV="1">
             <a:off x="6344123" y="3352056"/>
-            <a:ext cx="3814122" cy="696616"/>
+            <a:ext cx="3814122" cy="623144"/>
           </a:xfrm>
           <a:prstGeom prst="bentConnector3">
             <a:avLst/>
@@ -4420,8 +4421,8 @@
         </p:nvCxnSpPr>
         <p:spPr>
           <a:xfrm rot="10800000">
-            <a:off x="6344123" y="4048673"/>
-            <a:ext cx="3814122" cy="351943"/>
+            <a:off x="6344123" y="3975201"/>
+            <a:ext cx="3814122" cy="425415"/>
           </a:xfrm>
           <a:prstGeom prst="bentConnector3">
             <a:avLst/>
@@ -4536,8 +4537,8 @@
         </p:nvSpPr>
         <p:spPr>
           <a:xfrm>
-            <a:off x="5571455" y="4787915"/>
-            <a:ext cx="2150827" cy="523220"/>
+            <a:off x="5687464" y="4660443"/>
+            <a:ext cx="3362231" cy="307777"/>
           </a:xfrm>
           <a:prstGeom prst="rect">
             <a:avLst/>
@@ -4571,7 +4572,7 @@
         </p:nvSpPr>
         <p:spPr>
           <a:xfrm>
-            <a:off x="5585402" y="3212316"/>
+            <a:off x="5592502" y="3056628"/>
             <a:ext cx="815548" cy="307777"/>
           </a:xfrm>
           <a:prstGeom prst="rect">
@@ -4606,7 +4607,7 @@
         </p:nvSpPr>
         <p:spPr>
           <a:xfrm>
-            <a:off x="3853930" y="3732096"/>
+            <a:off x="3894016" y="3660209"/>
             <a:ext cx="815548" cy="307777"/>
           </a:xfrm>
           <a:prstGeom prst="rect">
@@ -4622,7 +4623,7 @@
           <a:p>
             <a:r>
               <a:rPr lang="en-US" sz="1400" dirty="0"/>
-              <a:t>??</a:t>
+              <a:t>I2C</a:t>
             </a:r>
           </a:p>
         </p:txBody>
@@ -4641,8 +4642,8 @@
         </p:nvSpPr>
         <p:spPr>
           <a:xfrm>
-            <a:off x="3322568" y="6319777"/>
-            <a:ext cx="4928616" cy="307777"/>
+            <a:off x="3742627" y="5955937"/>
+            <a:ext cx="4075321" cy="307777"/>
           </a:xfrm>
           <a:prstGeom prst="rect">
             <a:avLst/>
@@ -4691,8 +4692,8 @@
         </p:nvSpPr>
         <p:spPr>
           <a:xfrm>
-            <a:off x="4367551" y="5912539"/>
-            <a:ext cx="2572745" cy="307777"/>
+            <a:off x="4614267" y="5655310"/>
+            <a:ext cx="1976572" cy="307777"/>
           </a:xfrm>
           <a:prstGeom prst="rect">
             <a:avLst/>
@@ -4726,7 +4727,7 @@
         </p:nvSpPr>
         <p:spPr>
           <a:xfrm>
-            <a:off x="3227485" y="2664239"/>
+            <a:off x="6138383" y="2535783"/>
             <a:ext cx="2033399" cy="461665"/>
           </a:xfrm>
           <a:prstGeom prst="rect">
@@ -4771,7 +4772,7 @@
         </p:nvSpPr>
         <p:spPr>
           <a:xfrm>
-            <a:off x="7134531" y="1855626"/>
+            <a:off x="7096104" y="1793781"/>
             <a:ext cx="2033399" cy="461665"/>
           </a:xfrm>
           <a:prstGeom prst="rect">
@@ -4867,7 +4868,7 @@
           <a:p>
             <a:r>
               <a:rPr lang="en-US" sz="1200" dirty="0"/>
-              <a:t>3V Coin Cell</a:t>
+              <a:t>3V Coin Cell *2</a:t>
             </a:r>
           </a:p>
         </p:txBody>
@@ -4886,7 +4887,7 @@
         </p:nvSpPr>
         <p:spPr>
           <a:xfrm>
-            <a:off x="7343866" y="1220656"/>
+            <a:off x="7343866" y="1259122"/>
             <a:ext cx="2527174" cy="461665"/>
           </a:xfrm>
           <a:prstGeom prst="rect">
@@ -4901,12 +4902,15 @@
           <a:lstStyle/>
           <a:p>
             <a:r>
+              <a:rPr lang="en-US" sz="1200" b="1" dirty="0"/>
+              <a:t>AP7380-33W5-7 (3.3)</a:t>
+            </a:r>
+          </a:p>
+          <a:p>
+            <a:r>
               <a:rPr lang="en-US" sz="1200" dirty="0"/>
               <a:t>AP7380-18W5-7 (1.8V Ideal)</a:t>
             </a:r>
-          </a:p>
-          <a:p>
-            <a:endParaRPr lang="en-US" sz="1200" dirty="0"/>
           </a:p>
         </p:txBody>
       </p:sp>
@@ -5043,6 +5047,167 @@
           </a:fontRef>
         </p:style>
       </p:cxnSp>
+      <p:sp>
+        <p:nvSpPr>
+          <p:cNvPr id="38" name="Rectangle 37">
+            <a:extLst>
+              <a:ext uri="{FF2B5EF4-FFF2-40B4-BE49-F238E27FC236}">
+                <a16:creationId xmlns:a16="http://schemas.microsoft.com/office/drawing/2014/main" id="{22488619-CECC-EDBD-C43D-BDD08C1913D6}"/>
+              </a:ext>
+            </a:extLst>
+          </p:cNvPr>
+          <p:cNvSpPr/>
+          <p:nvPr/>
+        </p:nvSpPr>
+        <p:spPr>
+          <a:xfrm>
+            <a:off x="3052255" y="2611756"/>
+            <a:ext cx="1380744" cy="307777"/>
+          </a:xfrm>
+          <a:prstGeom prst="rect">
+            <a:avLst/>
+          </a:prstGeom>
+        </p:spPr>
+        <p:style>
+          <a:lnRef idx="2">
+            <a:schemeClr val="accent5">
+              <a:shade val="50000"/>
+            </a:schemeClr>
+          </a:lnRef>
+          <a:fillRef idx="1">
+            <a:schemeClr val="accent5"/>
+          </a:fillRef>
+          <a:effectRef idx="0">
+            <a:schemeClr val="accent5"/>
+          </a:effectRef>
+          <a:fontRef idx="minor">
+            <a:schemeClr val="lt1"/>
+          </a:fontRef>
+        </p:style>
+        <p:txBody>
+          <a:bodyPr rtlCol="0" anchor="ctr"/>
+          <a:lstStyle/>
+          <a:p>
+            <a:pPr algn="ctr"/>
+            <a:r>
+              <a:rPr lang="en-US" sz="1400" dirty="0"/>
+              <a:t>Switch (Reset)</a:t>
+            </a:r>
+          </a:p>
+        </p:txBody>
+      </p:sp>
+      <p:cxnSp>
+        <p:nvCxnSpPr>
+          <p:cNvPr id="41" name="Straight Arrow Connector 40">
+            <a:extLst>
+              <a:ext uri="{FF2B5EF4-FFF2-40B4-BE49-F238E27FC236}">
+                <a16:creationId xmlns:a16="http://schemas.microsoft.com/office/drawing/2014/main" id="{4C80A62D-67F0-6180-580D-CB32E58E5A32}"/>
+              </a:ext>
+            </a:extLst>
+          </p:cNvPr>
+          <p:cNvCxnSpPr>
+            <a:stCxn id="38" idx="2"/>
+            <a:endCxn id="8" idx="0"/>
+          </p:cNvCxnSpPr>
+          <p:nvPr/>
+        </p:nvCxnSpPr>
+        <p:spPr>
+          <a:xfrm>
+            <a:off x="3742627" y="2919533"/>
+            <a:ext cx="1828828" cy="589883"/>
+          </a:xfrm>
+          <a:prstGeom prst="straightConnector1">
+            <a:avLst/>
+          </a:prstGeom>
+          <a:ln>
+            <a:tailEnd type="triangle"/>
+          </a:ln>
+        </p:spPr>
+        <p:style>
+          <a:lnRef idx="1">
+            <a:schemeClr val="accent1"/>
+          </a:lnRef>
+          <a:fillRef idx="0">
+            <a:schemeClr val="accent1"/>
+          </a:fillRef>
+          <a:effectRef idx="0">
+            <a:schemeClr val="accent1"/>
+          </a:effectRef>
+          <a:fontRef idx="minor">
+            <a:schemeClr val="tx1"/>
+          </a:fontRef>
+        </p:style>
+      </p:cxnSp>
+      <p:sp>
+        <p:nvSpPr>
+          <p:cNvPr id="53" name="TextBox 52">
+            <a:extLst>
+              <a:ext uri="{FF2B5EF4-FFF2-40B4-BE49-F238E27FC236}">
+                <a16:creationId xmlns:a16="http://schemas.microsoft.com/office/drawing/2014/main" id="{7127FC22-31EC-E4D4-62EC-9C51C2D55726}"/>
+              </a:ext>
+            </a:extLst>
+          </p:cNvPr>
+          <p:cNvSpPr txBox="1"/>
+          <p:nvPr/>
+        </p:nvSpPr>
+        <p:spPr>
+          <a:xfrm>
+            <a:off x="9966960" y="517902"/>
+            <a:ext cx="2158141" cy="646331"/>
+          </a:xfrm>
+          <a:prstGeom prst="rect">
+            <a:avLst/>
+          </a:prstGeom>
+          <a:noFill/>
+        </p:spPr>
+        <p:txBody>
+          <a:bodyPr wrap="square" rtlCol="0">
+            <a:spAutoFit/>
+          </a:bodyPr>
+          <a:lstStyle/>
+          <a:p>
+            <a:r>
+              <a:rPr lang="en-US" sz="1200" dirty="0"/>
+              <a:t>https://www.digikey.com/en/products/detail/keystone-electronics/1027/49724</a:t>
+            </a:r>
+          </a:p>
+        </p:txBody>
+      </p:sp>
+      <p:sp>
+        <p:nvSpPr>
+          <p:cNvPr id="56" name="TextBox 55">
+            <a:extLst>
+              <a:ext uri="{FF2B5EF4-FFF2-40B4-BE49-F238E27FC236}">
+                <a16:creationId xmlns:a16="http://schemas.microsoft.com/office/drawing/2014/main" id="{6B47D50C-8287-A04D-F08F-1DDF68AEBF49}"/>
+              </a:ext>
+            </a:extLst>
+          </p:cNvPr>
+          <p:cNvSpPr txBox="1"/>
+          <p:nvPr/>
+        </p:nvSpPr>
+        <p:spPr>
+          <a:xfrm>
+            <a:off x="2560965" y="4363055"/>
+            <a:ext cx="1440325" cy="276999"/>
+          </a:xfrm>
+          <a:prstGeom prst="rect">
+            <a:avLst/>
+          </a:prstGeom>
+          <a:noFill/>
+        </p:spPr>
+        <p:txBody>
+          <a:bodyPr wrap="square" rtlCol="0">
+            <a:spAutoFit/>
+          </a:bodyPr>
+          <a:lstStyle/>
+          <a:p>
+            <a:r>
+              <a:rPr lang="en-US" sz="1200" dirty="0"/>
+              <a:t>FM24V05-GTR</a:t>
+            </a:r>
+          </a:p>
+        </p:txBody>
+      </p:sp>
     </p:spTree>
     <p:extLst>
       <p:ext uri="{BB962C8B-B14F-4D97-AF65-F5344CB8AC3E}">

</xml_diff>

<commit_message>
Updated the design tree
</commit_message>
<xml_diff>
--- a/design.pptx
+++ b/design.pptx
@@ -259,7 +259,7 @@
           <a:p>
             <a:fld id="{24FD6ABC-FBB2-4D10-81CB-3943CF222665}" type="datetimeFigureOut">
               <a:rPr lang="en-US" smtClean="0"/>
-              <a:t>3/21/2023</a:t>
+              <a:t>3/23/2023</a:t>
             </a:fld>
             <a:endParaRPr lang="en-US"/>
           </a:p>
@@ -457,7 +457,7 @@
           <a:p>
             <a:fld id="{24FD6ABC-FBB2-4D10-81CB-3943CF222665}" type="datetimeFigureOut">
               <a:rPr lang="en-US" smtClean="0"/>
-              <a:t>3/21/2023</a:t>
+              <a:t>3/23/2023</a:t>
             </a:fld>
             <a:endParaRPr lang="en-US"/>
           </a:p>
@@ -665,7 +665,7 @@
           <a:p>
             <a:fld id="{24FD6ABC-FBB2-4D10-81CB-3943CF222665}" type="datetimeFigureOut">
               <a:rPr lang="en-US" smtClean="0"/>
-              <a:t>3/21/2023</a:t>
+              <a:t>3/23/2023</a:t>
             </a:fld>
             <a:endParaRPr lang="en-US"/>
           </a:p>
@@ -863,7 +863,7 @@
           <a:p>
             <a:fld id="{24FD6ABC-FBB2-4D10-81CB-3943CF222665}" type="datetimeFigureOut">
               <a:rPr lang="en-US" smtClean="0"/>
-              <a:t>3/21/2023</a:t>
+              <a:t>3/23/2023</a:t>
             </a:fld>
             <a:endParaRPr lang="en-US"/>
           </a:p>
@@ -1138,7 +1138,7 @@
           <a:p>
             <a:fld id="{24FD6ABC-FBB2-4D10-81CB-3943CF222665}" type="datetimeFigureOut">
               <a:rPr lang="en-US" smtClean="0"/>
-              <a:t>3/21/2023</a:t>
+              <a:t>3/23/2023</a:t>
             </a:fld>
             <a:endParaRPr lang="en-US"/>
           </a:p>
@@ -1403,7 +1403,7 @@
           <a:p>
             <a:fld id="{24FD6ABC-FBB2-4D10-81CB-3943CF222665}" type="datetimeFigureOut">
               <a:rPr lang="en-US" smtClean="0"/>
-              <a:t>3/21/2023</a:t>
+              <a:t>3/23/2023</a:t>
             </a:fld>
             <a:endParaRPr lang="en-US"/>
           </a:p>
@@ -1815,7 +1815,7 @@
           <a:p>
             <a:fld id="{24FD6ABC-FBB2-4D10-81CB-3943CF222665}" type="datetimeFigureOut">
               <a:rPr lang="en-US" smtClean="0"/>
-              <a:t>3/21/2023</a:t>
+              <a:t>3/23/2023</a:t>
             </a:fld>
             <a:endParaRPr lang="en-US"/>
           </a:p>
@@ -1956,7 +1956,7 @@
           <a:p>
             <a:fld id="{24FD6ABC-FBB2-4D10-81CB-3943CF222665}" type="datetimeFigureOut">
               <a:rPr lang="en-US" smtClean="0"/>
-              <a:t>3/21/2023</a:t>
+              <a:t>3/23/2023</a:t>
             </a:fld>
             <a:endParaRPr lang="en-US"/>
           </a:p>
@@ -2069,7 +2069,7 @@
           <a:p>
             <a:fld id="{24FD6ABC-FBB2-4D10-81CB-3943CF222665}" type="datetimeFigureOut">
               <a:rPr lang="en-US" smtClean="0"/>
-              <a:t>3/21/2023</a:t>
+              <a:t>3/23/2023</a:t>
             </a:fld>
             <a:endParaRPr lang="en-US"/>
           </a:p>
@@ -2380,7 +2380,7 @@
           <a:p>
             <a:fld id="{24FD6ABC-FBB2-4D10-81CB-3943CF222665}" type="datetimeFigureOut">
               <a:rPr lang="en-US" smtClean="0"/>
-              <a:t>3/21/2023</a:t>
+              <a:t>3/23/2023</a:t>
             </a:fld>
             <a:endParaRPr lang="en-US"/>
           </a:p>
@@ -2668,7 +2668,7 @@
           <a:p>
             <a:fld id="{24FD6ABC-FBB2-4D10-81CB-3943CF222665}" type="datetimeFigureOut">
               <a:rPr lang="en-US" smtClean="0"/>
-              <a:t>3/21/2023</a:t>
+              <a:t>3/23/2023</a:t>
             </a:fld>
             <a:endParaRPr lang="en-US"/>
           </a:p>
@@ -2909,7 +2909,7 @@
           <a:p>
             <a:fld id="{24FD6ABC-FBB2-4D10-81CB-3943CF222665}" type="datetimeFigureOut">
               <a:rPr lang="en-US" smtClean="0"/>
-              <a:t>3/21/2023</a:t>
+              <a:t>3/23/2023</a:t>
             </a:fld>
             <a:endParaRPr lang="en-US"/>
           </a:p>
@@ -3328,56 +3328,6 @@
       </p:grpSpPr>
       <p:sp>
         <p:nvSpPr>
-          <p:cNvPr id="40" name="Rectangle 39">
-            <a:extLst>
-              <a:ext uri="{FF2B5EF4-FFF2-40B4-BE49-F238E27FC236}">
-                <a16:creationId xmlns:a16="http://schemas.microsoft.com/office/drawing/2014/main" id="{3AD6B264-3478-0DFB-8DBF-452BD02E5769}"/>
-              </a:ext>
-            </a:extLst>
-          </p:cNvPr>
-          <p:cNvSpPr/>
-          <p:nvPr/>
-        </p:nvSpPr>
-        <p:spPr>
-          <a:xfrm>
-            <a:off x="2087418" y="329184"/>
-            <a:ext cx="7879542" cy="5243241"/>
-          </a:xfrm>
-          <a:prstGeom prst="rect">
-            <a:avLst/>
-          </a:prstGeom>
-          <a:noFill/>
-          <a:ln w="38100">
-            <a:prstDash val="lgDash"/>
-          </a:ln>
-        </p:spPr>
-        <p:style>
-          <a:lnRef idx="2">
-            <a:schemeClr val="accent1">
-              <a:shade val="50000"/>
-            </a:schemeClr>
-          </a:lnRef>
-          <a:fillRef idx="1">
-            <a:schemeClr val="accent1"/>
-          </a:fillRef>
-          <a:effectRef idx="0">
-            <a:schemeClr val="accent1"/>
-          </a:effectRef>
-          <a:fontRef idx="minor">
-            <a:schemeClr val="lt1"/>
-          </a:fontRef>
-        </p:style>
-        <p:txBody>
-          <a:bodyPr rtlCol="0" anchor="ctr"/>
-          <a:lstStyle/>
-          <a:p>
-            <a:pPr algn="ctr"/>
-            <a:endParaRPr lang="en-US"/>
-          </a:p>
-        </p:txBody>
-      </p:sp>
-      <p:sp>
-        <p:nvSpPr>
           <p:cNvPr id="4" name="TextBox 3">
             <a:extLst>
               <a:ext uri="{FF2B5EF4-FFF2-40B4-BE49-F238E27FC236}">
@@ -3656,12 +3606,177 @@
         </p:nvSpPr>
         <p:spPr>
           <a:xfrm>
-            <a:off x="4798787" y="3509416"/>
-            <a:ext cx="1545336" cy="931567"/>
-          </a:xfrm>
-          <a:prstGeom prst="rect">
+            <a:off x="4059936" y="3538727"/>
+            <a:ext cx="2020824" cy="1335025"/>
+          </a:xfrm>
+          <a:custGeom>
             <a:avLst/>
-          </a:prstGeom>
+            <a:gdLst>
+              <a:gd name="connsiteX0" fmla="*/ 0 w 1999422"/>
+              <a:gd name="connsiteY0" fmla="*/ 0 h 1308519"/>
+              <a:gd name="connsiteX1" fmla="*/ 1999422 w 1999422"/>
+              <a:gd name="connsiteY1" fmla="*/ 0 h 1308519"/>
+              <a:gd name="connsiteX2" fmla="*/ 1999422 w 1999422"/>
+              <a:gd name="connsiteY2" fmla="*/ 1308519 h 1308519"/>
+              <a:gd name="connsiteX3" fmla="*/ 0 w 1999422"/>
+              <a:gd name="connsiteY3" fmla="*/ 1308519 h 1308519"/>
+              <a:gd name="connsiteX4" fmla="*/ 0 w 1999422"/>
+              <a:gd name="connsiteY4" fmla="*/ 0 h 1308519"/>
+              <a:gd name="connsiteX0" fmla="*/ 0 w 1999422"/>
+              <a:gd name="connsiteY0" fmla="*/ 0 h 1316622"/>
+              <a:gd name="connsiteX1" fmla="*/ 1999422 w 1999422"/>
+              <a:gd name="connsiteY1" fmla="*/ 0 h 1316622"/>
+              <a:gd name="connsiteX2" fmla="*/ 1999422 w 1999422"/>
+              <a:gd name="connsiteY2" fmla="*/ 1308519 h 1316622"/>
+              <a:gd name="connsiteX3" fmla="*/ 574072 w 1999422"/>
+              <a:gd name="connsiteY3" fmla="*/ 1316622 h 1316622"/>
+              <a:gd name="connsiteX4" fmla="*/ 0 w 1999422"/>
+              <a:gd name="connsiteY4" fmla="*/ 1308519 h 1316622"/>
+              <a:gd name="connsiteX5" fmla="*/ 0 w 1999422"/>
+              <a:gd name="connsiteY5" fmla="*/ 0 h 1316622"/>
+              <a:gd name="connsiteX0" fmla="*/ 0 w 1999422"/>
+              <a:gd name="connsiteY0" fmla="*/ 0 h 1316622"/>
+              <a:gd name="connsiteX1" fmla="*/ 1999422 w 1999422"/>
+              <a:gd name="connsiteY1" fmla="*/ 0 h 1316622"/>
+              <a:gd name="connsiteX2" fmla="*/ 1999422 w 1999422"/>
+              <a:gd name="connsiteY2" fmla="*/ 1308519 h 1316622"/>
+              <a:gd name="connsiteX3" fmla="*/ 1351312 w 1999422"/>
+              <a:gd name="connsiteY3" fmla="*/ 1316621 h 1316622"/>
+              <a:gd name="connsiteX4" fmla="*/ 574072 w 1999422"/>
+              <a:gd name="connsiteY4" fmla="*/ 1316622 h 1316622"/>
+              <a:gd name="connsiteX5" fmla="*/ 0 w 1999422"/>
+              <a:gd name="connsiteY5" fmla="*/ 1308519 h 1316622"/>
+              <a:gd name="connsiteX6" fmla="*/ 0 w 1999422"/>
+              <a:gd name="connsiteY6" fmla="*/ 0 h 1316622"/>
+              <a:gd name="connsiteX0" fmla="*/ 0 w 2000536"/>
+              <a:gd name="connsiteY0" fmla="*/ 0 h 1316622"/>
+              <a:gd name="connsiteX1" fmla="*/ 1999422 w 2000536"/>
+              <a:gd name="connsiteY1" fmla="*/ 0 h 1316622"/>
+              <a:gd name="connsiteX2" fmla="*/ 2000536 w 2000536"/>
+              <a:gd name="connsiteY2" fmla="*/ 603389 h 1316622"/>
+              <a:gd name="connsiteX3" fmla="*/ 1999422 w 2000536"/>
+              <a:gd name="connsiteY3" fmla="*/ 1308519 h 1316622"/>
+              <a:gd name="connsiteX4" fmla="*/ 1351312 w 2000536"/>
+              <a:gd name="connsiteY4" fmla="*/ 1316621 h 1316622"/>
+              <a:gd name="connsiteX5" fmla="*/ 574072 w 2000536"/>
+              <a:gd name="connsiteY5" fmla="*/ 1316622 h 1316622"/>
+              <a:gd name="connsiteX6" fmla="*/ 0 w 2000536"/>
+              <a:gd name="connsiteY6" fmla="*/ 1308519 h 1316622"/>
+              <a:gd name="connsiteX7" fmla="*/ 0 w 2000536"/>
+              <a:gd name="connsiteY7" fmla="*/ 0 h 1316622"/>
+              <a:gd name="connsiteX0" fmla="*/ 0 w 2000536"/>
+              <a:gd name="connsiteY0" fmla="*/ 18403 h 1335025"/>
+              <a:gd name="connsiteX1" fmla="*/ 1049560 w 2000536"/>
+              <a:gd name="connsiteY1" fmla="*/ 0 h 1335025"/>
+              <a:gd name="connsiteX2" fmla="*/ 1999422 w 2000536"/>
+              <a:gd name="connsiteY2" fmla="*/ 18403 h 1335025"/>
+              <a:gd name="connsiteX3" fmla="*/ 2000536 w 2000536"/>
+              <a:gd name="connsiteY3" fmla="*/ 621792 h 1335025"/>
+              <a:gd name="connsiteX4" fmla="*/ 1999422 w 2000536"/>
+              <a:gd name="connsiteY4" fmla="*/ 1326922 h 1335025"/>
+              <a:gd name="connsiteX5" fmla="*/ 1351312 w 2000536"/>
+              <a:gd name="connsiteY5" fmla="*/ 1335024 h 1335025"/>
+              <a:gd name="connsiteX6" fmla="*/ 574072 w 2000536"/>
+              <a:gd name="connsiteY6" fmla="*/ 1335025 h 1335025"/>
+              <a:gd name="connsiteX7" fmla="*/ 0 w 2000536"/>
+              <a:gd name="connsiteY7" fmla="*/ 1326922 h 1335025"/>
+              <a:gd name="connsiteX8" fmla="*/ 0 w 2000536"/>
+              <a:gd name="connsiteY8" fmla="*/ 18403 h 1335025"/>
+              <a:gd name="connsiteX0" fmla="*/ 20288 w 2020824"/>
+              <a:gd name="connsiteY0" fmla="*/ 18403 h 1335025"/>
+              <a:gd name="connsiteX1" fmla="*/ 1069848 w 2020824"/>
+              <a:gd name="connsiteY1" fmla="*/ 0 h 1335025"/>
+              <a:gd name="connsiteX2" fmla="*/ 2019710 w 2020824"/>
+              <a:gd name="connsiteY2" fmla="*/ 18403 h 1335025"/>
+              <a:gd name="connsiteX3" fmla="*/ 2020824 w 2020824"/>
+              <a:gd name="connsiteY3" fmla="*/ 621792 h 1335025"/>
+              <a:gd name="connsiteX4" fmla="*/ 2019710 w 2020824"/>
+              <a:gd name="connsiteY4" fmla="*/ 1326922 h 1335025"/>
+              <a:gd name="connsiteX5" fmla="*/ 1371600 w 2020824"/>
+              <a:gd name="connsiteY5" fmla="*/ 1335024 h 1335025"/>
+              <a:gd name="connsiteX6" fmla="*/ 594360 w 2020824"/>
+              <a:gd name="connsiteY6" fmla="*/ 1335025 h 1335025"/>
+              <a:gd name="connsiteX7" fmla="*/ 20288 w 2020824"/>
+              <a:gd name="connsiteY7" fmla="*/ 1326922 h 1335025"/>
+              <a:gd name="connsiteX8" fmla="*/ 0 w 2020824"/>
+              <a:gd name="connsiteY8" fmla="*/ 713233 h 1335025"/>
+              <a:gd name="connsiteX9" fmla="*/ 20288 w 2020824"/>
+              <a:gd name="connsiteY9" fmla="*/ 18403 h 1335025"/>
+            </a:gdLst>
+            <a:ahLst/>
+            <a:cxnLst>
+              <a:cxn ang="0">
+                <a:pos x="connsiteX0" y="connsiteY0"/>
+              </a:cxn>
+              <a:cxn ang="0">
+                <a:pos x="connsiteX1" y="connsiteY1"/>
+              </a:cxn>
+              <a:cxn ang="0">
+                <a:pos x="connsiteX2" y="connsiteY2"/>
+              </a:cxn>
+              <a:cxn ang="0">
+                <a:pos x="connsiteX3" y="connsiteY3"/>
+              </a:cxn>
+              <a:cxn ang="0">
+                <a:pos x="connsiteX4" y="connsiteY4"/>
+              </a:cxn>
+              <a:cxn ang="0">
+                <a:pos x="connsiteX5" y="connsiteY5"/>
+              </a:cxn>
+              <a:cxn ang="0">
+                <a:pos x="connsiteX6" y="connsiteY6"/>
+              </a:cxn>
+              <a:cxn ang="0">
+                <a:pos x="connsiteX7" y="connsiteY7"/>
+              </a:cxn>
+              <a:cxn ang="0">
+                <a:pos x="connsiteX8" y="connsiteY8"/>
+              </a:cxn>
+              <a:cxn ang="0">
+                <a:pos x="connsiteX9" y="connsiteY9"/>
+              </a:cxn>
+            </a:cxnLst>
+            <a:rect l="l" t="t" r="r" b="b"/>
+            <a:pathLst>
+              <a:path w="2020824" h="1335025">
+                <a:moveTo>
+                  <a:pt x="20288" y="18403"/>
+                </a:moveTo>
+                <a:lnTo>
+                  <a:pt x="1069848" y="0"/>
+                </a:lnTo>
+                <a:lnTo>
+                  <a:pt x="2019710" y="18403"/>
+                </a:lnTo>
+                <a:cubicBezTo>
+                  <a:pt x="2020081" y="219533"/>
+                  <a:pt x="2020453" y="420662"/>
+                  <a:pt x="2020824" y="621792"/>
+                </a:cubicBezTo>
+                <a:cubicBezTo>
+                  <a:pt x="2020453" y="856835"/>
+                  <a:pt x="2020081" y="1091879"/>
+                  <a:pt x="2019710" y="1326922"/>
+                </a:cubicBezTo>
+                <a:lnTo>
+                  <a:pt x="1371600" y="1335024"/>
+                </a:lnTo>
+                <a:lnTo>
+                  <a:pt x="594360" y="1335025"/>
+                </a:lnTo>
+                <a:lnTo>
+                  <a:pt x="20288" y="1326922"/>
+                </a:lnTo>
+                <a:lnTo>
+                  <a:pt x="0" y="713233"/>
+                </a:lnTo>
+                <a:lnTo>
+                  <a:pt x="20288" y="18403"/>
+                </a:lnTo>
+                <a:close/>
+              </a:path>
+            </a:pathLst>
+          </a:custGeom>
         </p:spPr>
         <p:style>
           <a:lnRef idx="2">
@@ -3700,10 +3815,10 @@
       </p:sp>
       <p:sp>
         <p:nvSpPr>
-          <p:cNvPr id="9" name="Rectangle 8">
-            <a:extLst>
-              <a:ext uri="{FF2B5EF4-FFF2-40B4-BE49-F238E27FC236}">
-                <a16:creationId xmlns:a16="http://schemas.microsoft.com/office/drawing/2014/main" id="{E7F361C0-6E03-FC17-0748-02E788E04497}"/>
+          <p:cNvPr id="10" name="Rectangle 9">
+            <a:extLst>
+              <a:ext uri="{FF2B5EF4-FFF2-40B4-BE49-F238E27FC236}">
+                <a16:creationId xmlns:a16="http://schemas.microsoft.com/office/drawing/2014/main" id="{EAB32768-F17C-EC99-F1AC-FE306EF66154}"/>
               </a:ext>
             </a:extLst>
           </p:cNvPr>
@@ -3712,8 +3827,8 @@
         </p:nvSpPr>
         <p:spPr>
           <a:xfrm>
-            <a:off x="5004527" y="2590843"/>
-            <a:ext cx="1133856" cy="307777"/>
+            <a:off x="7806008" y="2758555"/>
+            <a:ext cx="1694495" cy="307777"/>
           </a:xfrm>
           <a:prstGeom prst="rect">
             <a:avLst/>
@@ -3742,17 +3857,17 @@
             <a:pPr algn="ctr"/>
             <a:r>
               <a:rPr lang="en-US" sz="1400" dirty="0"/>
-              <a:t>Status LED</a:t>
-            </a:r>
-          </a:p>
-        </p:txBody>
-      </p:sp>
-      <p:sp>
-        <p:nvSpPr>
-          <p:cNvPr id="10" name="Rectangle 9">
-            <a:extLst>
-              <a:ext uri="{FF2B5EF4-FFF2-40B4-BE49-F238E27FC236}">
-                <a16:creationId xmlns:a16="http://schemas.microsoft.com/office/drawing/2014/main" id="{EAB32768-F17C-EC99-F1AC-FE306EF66154}"/>
+              <a:t>Power LED (Green)</a:t>
+            </a:r>
+          </a:p>
+        </p:txBody>
+      </p:sp>
+      <p:sp>
+        <p:nvSpPr>
+          <p:cNvPr id="13" name="Rectangle 12">
+            <a:extLst>
+              <a:ext uri="{FF2B5EF4-FFF2-40B4-BE49-F238E27FC236}">
+                <a16:creationId xmlns:a16="http://schemas.microsoft.com/office/drawing/2014/main" id="{6A53A14C-3DD5-E089-A5E2-6B17464A2C84}"/>
               </a:ext>
             </a:extLst>
           </p:cNvPr>
@@ -3761,8 +3876,8 @@
         </p:nvSpPr>
         <p:spPr>
           <a:xfrm>
-            <a:off x="5966317" y="1879378"/>
-            <a:ext cx="1133856" cy="307777"/>
+            <a:off x="3141098" y="5707497"/>
+            <a:ext cx="2088956" cy="490797"/>
           </a:xfrm>
           <a:prstGeom prst="rect">
             <a:avLst/>
@@ -3791,17 +3906,24 @@
             <a:pPr algn="ctr"/>
             <a:r>
               <a:rPr lang="en-US" sz="1400" dirty="0"/>
-              <a:t>Power LED</a:t>
-            </a:r>
-          </a:p>
-        </p:txBody>
-      </p:sp>
-      <p:sp>
-        <p:nvSpPr>
-          <p:cNvPr id="13" name="Rectangle 12">
-            <a:extLst>
-              <a:ext uri="{FF2B5EF4-FFF2-40B4-BE49-F238E27FC236}">
-                <a16:creationId xmlns:a16="http://schemas.microsoft.com/office/drawing/2014/main" id="{6A53A14C-3DD5-E089-A5E2-6B17464A2C84}"/>
+              <a:t>Light Sensors</a:t>
+            </a:r>
+          </a:p>
+          <a:p>
+            <a:pPr algn="ctr"/>
+            <a:r>
+              <a:rPr lang="en-US" sz="1400" dirty="0"/>
+              <a:t>Photoresistor(s) 1..N</a:t>
+            </a:r>
+          </a:p>
+        </p:txBody>
+      </p:sp>
+      <p:sp>
+        <p:nvSpPr>
+          <p:cNvPr id="15" name="Rectangle 14">
+            <a:extLst>
+              <a:ext uri="{FF2B5EF4-FFF2-40B4-BE49-F238E27FC236}">
+                <a16:creationId xmlns:a16="http://schemas.microsoft.com/office/drawing/2014/main" id="{7906ED0B-D0CE-FD45-5981-225DED2D84F7}"/>
               </a:ext>
             </a:extLst>
           </p:cNvPr>
@@ -3810,8 +3932,8 @@
         </p:nvSpPr>
         <p:spPr>
           <a:xfrm>
-            <a:off x="3954110" y="4982647"/>
-            <a:ext cx="3234690" cy="490797"/>
+            <a:off x="5645449" y="5680428"/>
+            <a:ext cx="1159028" cy="490797"/>
           </a:xfrm>
           <a:prstGeom prst="rect">
             <a:avLst/>
@@ -3840,24 +3962,17 @@
             <a:pPr algn="ctr"/>
             <a:r>
               <a:rPr lang="en-US" sz="1400" dirty="0"/>
-              <a:t>Photo Resistor (Array)</a:t>
-            </a:r>
-          </a:p>
-          <a:p>
-            <a:pPr algn="ctr"/>
-            <a:r>
-              <a:rPr lang="en-US" sz="1400" dirty="0"/>
-              <a:t>1-2 for each direction</a:t>
-            </a:r>
-          </a:p>
-        </p:txBody>
-      </p:sp>
-      <p:sp>
-        <p:nvSpPr>
-          <p:cNvPr id="15" name="Rectangle 14">
-            <a:extLst>
-              <a:ext uri="{FF2B5EF4-FFF2-40B4-BE49-F238E27FC236}">
-                <a16:creationId xmlns:a16="http://schemas.microsoft.com/office/drawing/2014/main" id="{7906ED0B-D0CE-FD45-5981-225DED2D84F7}"/>
+              <a:t>FRAM</a:t>
+            </a:r>
+          </a:p>
+        </p:txBody>
+      </p:sp>
+      <p:sp>
+        <p:nvSpPr>
+          <p:cNvPr id="18" name="Rectangle 17">
+            <a:extLst>
+              <a:ext uri="{FF2B5EF4-FFF2-40B4-BE49-F238E27FC236}">
+                <a16:creationId xmlns:a16="http://schemas.microsoft.com/office/drawing/2014/main" id="{3160813B-1336-C94C-9691-9165A5F43E22}"/>
               </a:ext>
             </a:extLst>
           </p:cNvPr>
@@ -3866,12 +3981,327 @@
         </p:nvSpPr>
         <p:spPr>
           <a:xfrm>
-            <a:off x="2550252" y="3651256"/>
-            <a:ext cx="1133856" cy="647885"/>
+            <a:off x="2701382" y="787001"/>
+            <a:ext cx="1942401" cy="307778"/>
           </a:xfrm>
           <a:prstGeom prst="rect">
             <a:avLst/>
           </a:prstGeom>
+        </p:spPr>
+        <p:style>
+          <a:lnRef idx="2">
+            <a:schemeClr val="accent4">
+              <a:shade val="50000"/>
+            </a:schemeClr>
+          </a:lnRef>
+          <a:fillRef idx="1">
+            <a:schemeClr val="accent4"/>
+          </a:fillRef>
+          <a:effectRef idx="0">
+            <a:schemeClr val="accent4"/>
+          </a:effectRef>
+          <a:fontRef idx="minor">
+            <a:schemeClr val="lt1"/>
+          </a:fontRef>
+        </p:style>
+        <p:txBody>
+          <a:bodyPr rtlCol="0" anchor="ctr"/>
+          <a:lstStyle/>
+          <a:p>
+            <a:pPr algn="ctr"/>
+            <a:r>
+              <a:rPr lang="en-US" sz="1400" dirty="0"/>
+              <a:t>Coin Cell Battery (3V)</a:t>
+            </a:r>
+          </a:p>
+        </p:txBody>
+      </p:sp>
+      <p:sp>
+        <p:nvSpPr>
+          <p:cNvPr id="20" name="Rectangle 19">
+            <a:extLst>
+              <a:ext uri="{FF2B5EF4-FFF2-40B4-BE49-F238E27FC236}">
+                <a16:creationId xmlns:a16="http://schemas.microsoft.com/office/drawing/2014/main" id="{6F1B3C03-A731-6152-B031-56A3CDDE57B0}"/>
+              </a:ext>
+            </a:extLst>
+          </p:cNvPr>
+          <p:cNvSpPr/>
+          <p:nvPr/>
+        </p:nvSpPr>
+        <p:spPr>
+          <a:xfrm>
+            <a:off x="2691497" y="2758556"/>
+            <a:ext cx="4732691" cy="307777"/>
+          </a:xfrm>
+          <a:prstGeom prst="rect">
+            <a:avLst/>
+          </a:prstGeom>
+        </p:spPr>
+        <p:style>
+          <a:lnRef idx="2">
+            <a:schemeClr val="accent4">
+              <a:shade val="50000"/>
+            </a:schemeClr>
+          </a:lnRef>
+          <a:fillRef idx="1">
+            <a:schemeClr val="accent4"/>
+          </a:fillRef>
+          <a:effectRef idx="0">
+            <a:schemeClr val="accent4"/>
+          </a:effectRef>
+          <a:fontRef idx="minor">
+            <a:schemeClr val="lt1"/>
+          </a:fontRef>
+        </p:style>
+        <p:txBody>
+          <a:bodyPr rtlCol="0" anchor="ctr"/>
+          <a:lstStyle/>
+          <a:p>
+            <a:pPr algn="ctr"/>
+            <a:r>
+              <a:rPr lang="en-US" sz="1400" dirty="0"/>
+              <a:t>3.3V Power BUS</a:t>
+            </a:r>
+          </a:p>
+        </p:txBody>
+      </p:sp>
+      <p:sp>
+        <p:nvSpPr>
+          <p:cNvPr id="34" name="Rectangle 33">
+            <a:extLst>
+              <a:ext uri="{FF2B5EF4-FFF2-40B4-BE49-F238E27FC236}">
+                <a16:creationId xmlns:a16="http://schemas.microsoft.com/office/drawing/2014/main" id="{DDA0AE39-E2FF-A2B4-DC84-D8D5BB67AA55}"/>
+              </a:ext>
+            </a:extLst>
+          </p:cNvPr>
+          <p:cNvSpPr/>
+          <p:nvPr/>
+        </p:nvSpPr>
+        <p:spPr>
+          <a:xfrm>
+            <a:off x="7332703" y="3912095"/>
+            <a:ext cx="2212109" cy="478835"/>
+          </a:xfrm>
+          <a:prstGeom prst="rect">
+            <a:avLst/>
+          </a:prstGeom>
+        </p:spPr>
+        <p:style>
+          <a:lnRef idx="2">
+            <a:schemeClr val="accent2">
+              <a:shade val="50000"/>
+            </a:schemeClr>
+          </a:lnRef>
+          <a:fillRef idx="1">
+            <a:schemeClr val="accent2"/>
+          </a:fillRef>
+          <a:effectRef idx="0">
+            <a:schemeClr val="accent2"/>
+          </a:effectRef>
+          <a:fontRef idx="minor">
+            <a:schemeClr val="lt1"/>
+          </a:fontRef>
+        </p:style>
+        <p:txBody>
+          <a:bodyPr rtlCol="0" anchor="ctr"/>
+          <a:lstStyle/>
+          <a:p>
+            <a:pPr algn="ctr"/>
+            <a:r>
+              <a:rPr lang="en-US" sz="1400" dirty="0"/>
+              <a:t>Serial Wire Debug (</a:t>
+            </a:r>
+            <a:r>
+              <a:rPr lang="en-US" sz="1400" dirty="0" err="1"/>
+              <a:t>STLink</a:t>
+            </a:r>
+            <a:r>
+              <a:rPr lang="en-US" sz="1400" dirty="0"/>
+              <a:t>)</a:t>
+            </a:r>
+          </a:p>
+        </p:txBody>
+      </p:sp>
+      <p:sp>
+        <p:nvSpPr>
+          <p:cNvPr id="43" name="Rectangle 42">
+            <a:extLst>
+              <a:ext uri="{FF2B5EF4-FFF2-40B4-BE49-F238E27FC236}">
+                <a16:creationId xmlns:a16="http://schemas.microsoft.com/office/drawing/2014/main" id="{B7DBF298-8D3D-7DF7-EE21-7A272E5ED15A}"/>
+              </a:ext>
+            </a:extLst>
+          </p:cNvPr>
+          <p:cNvSpPr/>
+          <p:nvPr/>
+        </p:nvSpPr>
+        <p:spPr>
+          <a:xfrm>
+            <a:off x="5702806" y="243541"/>
+            <a:ext cx="3163905" cy="478835"/>
+          </a:xfrm>
+          <a:prstGeom prst="rect">
+            <a:avLst/>
+          </a:prstGeom>
+        </p:spPr>
+        <p:style>
+          <a:lnRef idx="2">
+            <a:schemeClr val="accent2">
+              <a:shade val="50000"/>
+            </a:schemeClr>
+          </a:lnRef>
+          <a:fillRef idx="1">
+            <a:schemeClr val="accent2"/>
+          </a:fillRef>
+          <a:effectRef idx="0">
+            <a:schemeClr val="accent2"/>
+          </a:effectRef>
+          <a:fontRef idx="minor">
+            <a:schemeClr val="lt1"/>
+          </a:fontRef>
+        </p:style>
+        <p:txBody>
+          <a:bodyPr rtlCol="0" anchor="ctr"/>
+          <a:lstStyle/>
+          <a:p>
+            <a:pPr algn="ctr"/>
+            <a:r>
+              <a:rPr lang="en-US" sz="1400" dirty="0"/>
+              <a:t>Personal Computer</a:t>
+            </a:r>
+          </a:p>
+        </p:txBody>
+      </p:sp>
+      <p:sp>
+        <p:nvSpPr>
+          <p:cNvPr id="46" name="Rectangle 45">
+            <a:extLst>
+              <a:ext uri="{FF2B5EF4-FFF2-40B4-BE49-F238E27FC236}">
+                <a16:creationId xmlns:a16="http://schemas.microsoft.com/office/drawing/2014/main" id="{342CB1D2-03B0-9DA2-199C-D7712CB1160A}"/>
+              </a:ext>
+            </a:extLst>
+          </p:cNvPr>
+          <p:cNvSpPr/>
+          <p:nvPr/>
+        </p:nvSpPr>
+        <p:spPr>
+          <a:xfrm>
+            <a:off x="2701381" y="2147243"/>
+            <a:ext cx="4732691" cy="346340"/>
+          </a:xfrm>
+          <a:custGeom>
+            <a:avLst/>
+            <a:gdLst>
+              <a:gd name="connsiteX0" fmla="*/ 0 w 1843221"/>
+              <a:gd name="connsiteY0" fmla="*/ 0 h 461665"/>
+              <a:gd name="connsiteX1" fmla="*/ 1843221 w 1843221"/>
+              <a:gd name="connsiteY1" fmla="*/ 0 h 461665"/>
+              <a:gd name="connsiteX2" fmla="*/ 1843221 w 1843221"/>
+              <a:gd name="connsiteY2" fmla="*/ 461665 h 461665"/>
+              <a:gd name="connsiteX3" fmla="*/ 0 w 1843221"/>
+              <a:gd name="connsiteY3" fmla="*/ 461665 h 461665"/>
+              <a:gd name="connsiteX4" fmla="*/ 0 w 1843221"/>
+              <a:gd name="connsiteY4" fmla="*/ 0 h 461665"/>
+              <a:gd name="connsiteX0" fmla="*/ 0 w 1843221"/>
+              <a:gd name="connsiteY0" fmla="*/ 6835 h 468500"/>
+              <a:gd name="connsiteX1" fmla="*/ 1402376 w 1843221"/>
+              <a:gd name="connsiteY1" fmla="*/ 0 h 468500"/>
+              <a:gd name="connsiteX2" fmla="*/ 1843221 w 1843221"/>
+              <a:gd name="connsiteY2" fmla="*/ 6835 h 468500"/>
+              <a:gd name="connsiteX3" fmla="*/ 1843221 w 1843221"/>
+              <a:gd name="connsiteY3" fmla="*/ 468500 h 468500"/>
+              <a:gd name="connsiteX4" fmla="*/ 0 w 1843221"/>
+              <a:gd name="connsiteY4" fmla="*/ 468500 h 468500"/>
+              <a:gd name="connsiteX5" fmla="*/ 0 w 1843221"/>
+              <a:gd name="connsiteY5" fmla="*/ 6835 h 468500"/>
+              <a:gd name="connsiteX0" fmla="*/ 0 w 1843221"/>
+              <a:gd name="connsiteY0" fmla="*/ 6835 h 468500"/>
+              <a:gd name="connsiteX1" fmla="*/ 515408 w 1843221"/>
+              <a:gd name="connsiteY1" fmla="*/ 9144 h 468500"/>
+              <a:gd name="connsiteX2" fmla="*/ 1402376 w 1843221"/>
+              <a:gd name="connsiteY2" fmla="*/ 0 h 468500"/>
+              <a:gd name="connsiteX3" fmla="*/ 1843221 w 1843221"/>
+              <a:gd name="connsiteY3" fmla="*/ 6835 h 468500"/>
+              <a:gd name="connsiteX4" fmla="*/ 1843221 w 1843221"/>
+              <a:gd name="connsiteY4" fmla="*/ 468500 h 468500"/>
+              <a:gd name="connsiteX5" fmla="*/ 0 w 1843221"/>
+              <a:gd name="connsiteY5" fmla="*/ 468500 h 468500"/>
+              <a:gd name="connsiteX6" fmla="*/ 0 w 1843221"/>
+              <a:gd name="connsiteY6" fmla="*/ 6835 h 468500"/>
+              <a:gd name="connsiteX0" fmla="*/ 0 w 1843221"/>
+              <a:gd name="connsiteY0" fmla="*/ 6835 h 468500"/>
+              <a:gd name="connsiteX1" fmla="*/ 515408 w 1843221"/>
+              <a:gd name="connsiteY1" fmla="*/ 9144 h 468500"/>
+              <a:gd name="connsiteX2" fmla="*/ 1402376 w 1843221"/>
+              <a:gd name="connsiteY2" fmla="*/ 0 h 468500"/>
+              <a:gd name="connsiteX3" fmla="*/ 1843221 w 1843221"/>
+              <a:gd name="connsiteY3" fmla="*/ 6835 h 468500"/>
+              <a:gd name="connsiteX4" fmla="*/ 1843221 w 1843221"/>
+              <a:gd name="connsiteY4" fmla="*/ 468500 h 468500"/>
+              <a:gd name="connsiteX5" fmla="*/ 963464 w 1843221"/>
+              <a:gd name="connsiteY5" fmla="*/ 466344 h 468500"/>
+              <a:gd name="connsiteX6" fmla="*/ 0 w 1843221"/>
+              <a:gd name="connsiteY6" fmla="*/ 468500 h 468500"/>
+              <a:gd name="connsiteX7" fmla="*/ 0 w 1843221"/>
+              <a:gd name="connsiteY7" fmla="*/ 6835 h 468500"/>
+            </a:gdLst>
+            <a:ahLst/>
+            <a:cxnLst>
+              <a:cxn ang="0">
+                <a:pos x="connsiteX0" y="connsiteY0"/>
+              </a:cxn>
+              <a:cxn ang="0">
+                <a:pos x="connsiteX1" y="connsiteY1"/>
+              </a:cxn>
+              <a:cxn ang="0">
+                <a:pos x="connsiteX2" y="connsiteY2"/>
+              </a:cxn>
+              <a:cxn ang="0">
+                <a:pos x="connsiteX3" y="connsiteY3"/>
+              </a:cxn>
+              <a:cxn ang="0">
+                <a:pos x="connsiteX4" y="connsiteY4"/>
+              </a:cxn>
+              <a:cxn ang="0">
+                <a:pos x="connsiteX5" y="connsiteY5"/>
+              </a:cxn>
+              <a:cxn ang="0">
+                <a:pos x="connsiteX6" y="connsiteY6"/>
+              </a:cxn>
+              <a:cxn ang="0">
+                <a:pos x="connsiteX7" y="connsiteY7"/>
+              </a:cxn>
+            </a:cxnLst>
+            <a:rect l="l" t="t" r="r" b="b"/>
+            <a:pathLst>
+              <a:path w="1843221" h="468500">
+                <a:moveTo>
+                  <a:pt x="0" y="6835"/>
+                </a:moveTo>
+                <a:lnTo>
+                  <a:pt x="515408" y="9144"/>
+                </a:lnTo>
+                <a:lnTo>
+                  <a:pt x="1402376" y="0"/>
+                </a:lnTo>
+                <a:lnTo>
+                  <a:pt x="1843221" y="6835"/>
+                </a:lnTo>
+                <a:lnTo>
+                  <a:pt x="1843221" y="468500"/>
+                </a:lnTo>
+                <a:lnTo>
+                  <a:pt x="963464" y="466344"/>
+                </a:lnTo>
+                <a:lnTo>
+                  <a:pt x="0" y="468500"/>
+                </a:lnTo>
+                <a:lnTo>
+                  <a:pt x="0" y="6835"/>
+                </a:lnTo>
+                <a:close/>
+              </a:path>
+            </a:pathLst>
+          </a:custGeom>
         </p:spPr>
         <p:style>
           <a:lnRef idx="2">
@@ -3896,17 +4326,17 @@
             <a:pPr algn="ctr"/>
             <a:r>
               <a:rPr lang="en-US" sz="1400" dirty="0"/>
-              <a:t>FRAM</a:t>
-            </a:r>
-          </a:p>
-        </p:txBody>
-      </p:sp>
-      <p:sp>
-        <p:nvSpPr>
-          <p:cNvPr id="18" name="Rectangle 17">
-            <a:extLst>
-              <a:ext uri="{FF2B5EF4-FFF2-40B4-BE49-F238E27FC236}">
-                <a16:creationId xmlns:a16="http://schemas.microsoft.com/office/drawing/2014/main" id="{3160813B-1336-C94C-9691-9165A5F43E22}"/>
+              <a:t>Power Switch</a:t>
+            </a:r>
+          </a:p>
+        </p:txBody>
+      </p:sp>
+      <p:sp>
+        <p:nvSpPr>
+          <p:cNvPr id="38" name="Rectangle 37">
+            <a:extLst>
+              <a:ext uri="{FF2B5EF4-FFF2-40B4-BE49-F238E27FC236}">
+                <a16:creationId xmlns:a16="http://schemas.microsoft.com/office/drawing/2014/main" id="{22488619-CECC-EDBD-C43D-BDD08C1913D6}"/>
               </a:ext>
             </a:extLst>
           </p:cNvPr>
@@ -3915,8 +4345,57 @@
         </p:nvSpPr>
         <p:spPr>
           <a:xfrm>
-            <a:off x="7473597" y="689121"/>
-            <a:ext cx="1133856" cy="307777"/>
+            <a:off x="813816" y="4074168"/>
+            <a:ext cx="1833372" cy="307777"/>
+          </a:xfrm>
+          <a:prstGeom prst="rect">
+            <a:avLst/>
+          </a:prstGeom>
+        </p:spPr>
+        <p:style>
+          <a:lnRef idx="2">
+            <a:schemeClr val="accent5">
+              <a:shade val="50000"/>
+            </a:schemeClr>
+          </a:lnRef>
+          <a:fillRef idx="1">
+            <a:schemeClr val="accent5"/>
+          </a:fillRef>
+          <a:effectRef idx="0">
+            <a:schemeClr val="accent5"/>
+          </a:effectRef>
+          <a:fontRef idx="minor">
+            <a:schemeClr val="lt1"/>
+          </a:fontRef>
+        </p:style>
+        <p:txBody>
+          <a:bodyPr rtlCol="0" anchor="ctr"/>
+          <a:lstStyle/>
+          <a:p>
+            <a:pPr algn="ctr"/>
+            <a:r>
+              <a:rPr lang="en-US" sz="1400" dirty="0"/>
+              <a:t>Pushbutton (Reset)</a:t>
+            </a:r>
+          </a:p>
+        </p:txBody>
+      </p:sp>
+      <p:sp>
+        <p:nvSpPr>
+          <p:cNvPr id="9" name="Rectangle 8">
+            <a:extLst>
+              <a:ext uri="{FF2B5EF4-FFF2-40B4-BE49-F238E27FC236}">
+                <a16:creationId xmlns:a16="http://schemas.microsoft.com/office/drawing/2014/main" id="{6305D427-04FB-F4A5-7333-CCA837906494}"/>
+              </a:ext>
+            </a:extLst>
+          </p:cNvPr>
+          <p:cNvSpPr/>
+          <p:nvPr/>
+        </p:nvSpPr>
+        <p:spPr>
+          <a:xfrm>
+            <a:off x="5702808" y="787002"/>
+            <a:ext cx="1731264" cy="307777"/>
           </a:xfrm>
           <a:prstGeom prst="rect">
             <a:avLst/>
@@ -3945,17 +4424,17 @@
             <a:pPr algn="ctr"/>
             <a:r>
               <a:rPr lang="en-US" sz="1400" dirty="0"/>
-              <a:t>Battery</a:t>
-            </a:r>
-          </a:p>
-        </p:txBody>
-      </p:sp>
-      <p:sp>
-        <p:nvSpPr>
-          <p:cNvPr id="19" name="Rectangle 18">
-            <a:extLst>
-              <a:ext uri="{FF2B5EF4-FFF2-40B4-BE49-F238E27FC236}">
-                <a16:creationId xmlns:a16="http://schemas.microsoft.com/office/drawing/2014/main" id="{A972D063-6437-D087-D992-61A031A86674}"/>
+              <a:t>USB (5V)</a:t>
+            </a:r>
+          </a:p>
+        </p:txBody>
+      </p:sp>
+      <p:sp>
+        <p:nvSpPr>
+          <p:cNvPr id="11" name="Rectangle 10">
+            <a:extLst>
+              <a:ext uri="{FF2B5EF4-FFF2-40B4-BE49-F238E27FC236}">
+                <a16:creationId xmlns:a16="http://schemas.microsoft.com/office/drawing/2014/main" id="{996156EC-48E8-7A5D-C073-54542F4BDC15}"/>
               </a:ext>
             </a:extLst>
           </p:cNvPr>
@@ -3964,12 +4443,113 @@
         </p:nvSpPr>
         <p:spPr>
           <a:xfrm>
-            <a:off x="5862584" y="1285575"/>
-            <a:ext cx="1333183" cy="307777"/>
+            <a:off x="2701381" y="1386821"/>
+            <a:ext cx="1942401" cy="307777"/>
           </a:xfrm>
           <a:prstGeom prst="rect">
             <a:avLst/>
           </a:prstGeom>
+        </p:spPr>
+        <p:style>
+          <a:lnRef idx="2">
+            <a:schemeClr val="accent2">
+              <a:shade val="50000"/>
+            </a:schemeClr>
+          </a:lnRef>
+          <a:fillRef idx="1">
+            <a:schemeClr val="accent2"/>
+          </a:fillRef>
+          <a:effectRef idx="0">
+            <a:schemeClr val="accent2"/>
+          </a:effectRef>
+          <a:fontRef idx="minor">
+            <a:schemeClr val="lt1"/>
+          </a:fontRef>
+        </p:style>
+        <p:txBody>
+          <a:bodyPr rtlCol="0" anchor="ctr"/>
+          <a:lstStyle/>
+          <a:p>
+            <a:pPr algn="ctr"/>
+            <a:r>
+              <a:rPr lang="en-US" sz="1400" dirty="0"/>
+              <a:t>Buck Regulator (3V)</a:t>
+            </a:r>
+          </a:p>
+        </p:txBody>
+      </p:sp>
+      <p:sp>
+        <p:nvSpPr>
+          <p:cNvPr id="12" name="Rectangle 11">
+            <a:extLst>
+              <a:ext uri="{FF2B5EF4-FFF2-40B4-BE49-F238E27FC236}">
+                <a16:creationId xmlns:a16="http://schemas.microsoft.com/office/drawing/2014/main" id="{054FFBB0-29DB-92B6-DC28-F6FE5752B149}"/>
+              </a:ext>
+            </a:extLst>
+          </p:cNvPr>
+          <p:cNvSpPr/>
+          <p:nvPr/>
+        </p:nvSpPr>
+        <p:spPr>
+          <a:xfrm>
+            <a:off x="5702807" y="1378614"/>
+            <a:ext cx="1721381" cy="468500"/>
+          </a:xfrm>
+          <a:prstGeom prst="rect">
+            <a:avLst/>
+          </a:prstGeom>
+        </p:spPr>
+        <p:style>
+          <a:lnRef idx="2">
+            <a:schemeClr val="accent2">
+              <a:shade val="50000"/>
+            </a:schemeClr>
+          </a:lnRef>
+          <a:fillRef idx="1">
+            <a:schemeClr val="accent2"/>
+          </a:fillRef>
+          <a:effectRef idx="0">
+            <a:schemeClr val="accent2"/>
+          </a:effectRef>
+          <a:fontRef idx="minor">
+            <a:schemeClr val="lt1"/>
+          </a:fontRef>
+        </p:style>
+        <p:txBody>
+          <a:bodyPr rtlCol="0" anchor="ctr"/>
+          <a:lstStyle/>
+          <a:p>
+            <a:pPr algn="ctr"/>
+            <a:r>
+              <a:rPr lang="en-US" sz="1400" dirty="0"/>
+              <a:t>Low Dropout Regulator (3V)</a:t>
+            </a:r>
+          </a:p>
+        </p:txBody>
+      </p:sp>
+      <p:sp>
+        <p:nvSpPr>
+          <p:cNvPr id="14" name="Rectangle 13">
+            <a:extLst>
+              <a:ext uri="{FF2B5EF4-FFF2-40B4-BE49-F238E27FC236}">
+                <a16:creationId xmlns:a16="http://schemas.microsoft.com/office/drawing/2014/main" id="{56736FDC-E208-32F4-1040-A04293036C81}"/>
+              </a:ext>
+            </a:extLst>
+          </p:cNvPr>
+          <p:cNvSpPr/>
+          <p:nvPr/>
+        </p:nvSpPr>
+        <p:spPr>
+          <a:xfrm>
+            <a:off x="7424189" y="787002"/>
+            <a:ext cx="1442523" cy="307777"/>
+          </a:xfrm>
+          <a:prstGeom prst="rect">
+            <a:avLst/>
+          </a:prstGeom>
+          <a:solidFill>
+            <a:schemeClr val="accent2"/>
+          </a:solidFill>
         </p:spPr>
         <p:style>
           <a:lnRef idx="2">
@@ -3994,80 +4574,30 @@
             <a:pPr algn="ctr"/>
             <a:r>
               <a:rPr lang="en-US" sz="1400" dirty="0"/>
-              <a:t>LDO Regulator</a:t>
-            </a:r>
-          </a:p>
-        </p:txBody>
-      </p:sp>
-      <p:sp>
-        <p:nvSpPr>
-          <p:cNvPr id="20" name="Rectangle 19">
-            <a:extLst>
-              <a:ext uri="{FF2B5EF4-FFF2-40B4-BE49-F238E27FC236}">
-                <a16:creationId xmlns:a16="http://schemas.microsoft.com/office/drawing/2014/main" id="{6F1B3C03-A731-6152-B031-56A3CDDE57B0}"/>
-              </a:ext>
-            </a:extLst>
-          </p:cNvPr>
-          <p:cNvSpPr/>
-          <p:nvPr/>
-        </p:nvSpPr>
-        <p:spPr>
-          <a:xfrm>
-            <a:off x="2495551" y="1285575"/>
-            <a:ext cx="2818195" cy="307777"/>
-          </a:xfrm>
-          <a:prstGeom prst="rect">
-            <a:avLst/>
-          </a:prstGeom>
-        </p:spPr>
-        <p:style>
-          <a:lnRef idx="2">
-            <a:schemeClr val="accent4">
-              <a:shade val="50000"/>
-            </a:schemeClr>
-          </a:lnRef>
-          <a:fillRef idx="1">
-            <a:schemeClr val="accent4"/>
-          </a:fillRef>
-          <a:effectRef idx="0">
-            <a:schemeClr val="accent4"/>
-          </a:effectRef>
-          <a:fontRef idx="minor">
-            <a:schemeClr val="lt1"/>
-          </a:fontRef>
-        </p:style>
-        <p:txBody>
-          <a:bodyPr rtlCol="0" anchor="ctr"/>
-          <a:lstStyle/>
-          <a:p>
-            <a:pPr algn="ctr"/>
-            <a:r>
-              <a:rPr lang="en-US" sz="1400" dirty="0"/>
-              <a:t>3.3V Power BUS</a:t>
+              <a:t>USB (Serial)</a:t>
             </a:r>
           </a:p>
         </p:txBody>
       </p:sp>
       <p:cxnSp>
         <p:nvCxnSpPr>
-          <p:cNvPr id="24" name="Straight Arrow Connector 23">
-            <a:extLst>
-              <a:ext uri="{FF2B5EF4-FFF2-40B4-BE49-F238E27FC236}">
-                <a16:creationId xmlns:a16="http://schemas.microsoft.com/office/drawing/2014/main" id="{853FE521-58D6-E981-0F89-36E8245E5ABC}"/>
+          <p:cNvPr id="17" name="Straight Arrow Connector 16">
+            <a:extLst>
+              <a:ext uri="{FF2B5EF4-FFF2-40B4-BE49-F238E27FC236}">
+                <a16:creationId xmlns:a16="http://schemas.microsoft.com/office/drawing/2014/main" id="{CE2CA8EF-0E9D-70FE-FE13-2A0A7A5D0378}"/>
               </a:ext>
             </a:extLst>
           </p:cNvPr>
           <p:cNvCxnSpPr>
-            <a:cxnSpLocks/>
-            <a:stCxn id="19" idx="1"/>
-            <a:endCxn id="20" idx="3"/>
+            <a:stCxn id="18" idx="2"/>
+            <a:endCxn id="11" idx="0"/>
           </p:cNvCxnSpPr>
           <p:nvPr/>
         </p:nvCxnSpPr>
         <p:spPr>
           <a:xfrm flipH="1">
-            <a:off x="5313746" y="1439464"/>
-            <a:ext cx="548838" cy="0"/>
+            <a:off x="3672582" y="1094779"/>
+            <a:ext cx="1" cy="292042"/>
           </a:xfrm>
           <a:prstGeom prst="straightConnector1">
             <a:avLst/>
@@ -4093,23 +4623,108 @@
       </p:cxnSp>
       <p:cxnSp>
         <p:nvCxnSpPr>
-          <p:cNvPr id="26" name="Straight Arrow Connector 25">
-            <a:extLst>
-              <a:ext uri="{FF2B5EF4-FFF2-40B4-BE49-F238E27FC236}">
-                <a16:creationId xmlns:a16="http://schemas.microsoft.com/office/drawing/2014/main" id="{282A88B3-9C81-AC4F-CF22-B0F953339128}"/>
+          <p:cNvPr id="21" name="Straight Arrow Connector 20">
+            <a:extLst>
+              <a:ext uri="{FF2B5EF4-FFF2-40B4-BE49-F238E27FC236}">
+                <a16:creationId xmlns:a16="http://schemas.microsoft.com/office/drawing/2014/main" id="{4FD77B42-455E-42C4-2CF5-314A482EF12A}"/>
               </a:ext>
             </a:extLst>
           </p:cNvPr>
           <p:cNvCxnSpPr>
-            <a:stCxn id="13" idx="0"/>
-            <a:endCxn id="8" idx="2"/>
+            <a:cxnSpLocks/>
+            <a:stCxn id="9" idx="2"/>
+            <a:endCxn id="12" idx="0"/>
           </p:cNvCxnSpPr>
           <p:nvPr/>
         </p:nvCxnSpPr>
         <p:spPr>
-          <a:xfrm flipV="1">
-            <a:off x="5571455" y="4440983"/>
-            <a:ext cx="0" cy="541664"/>
+          <a:xfrm flipH="1">
+            <a:off x="6563498" y="1094779"/>
+            <a:ext cx="4942" cy="283835"/>
+          </a:xfrm>
+          <a:prstGeom prst="straightConnector1">
+            <a:avLst/>
+          </a:prstGeom>
+          <a:ln>
+            <a:tailEnd type="triangle"/>
+          </a:ln>
+        </p:spPr>
+        <p:style>
+          <a:lnRef idx="1">
+            <a:schemeClr val="accent1"/>
+          </a:lnRef>
+          <a:fillRef idx="0">
+            <a:schemeClr val="accent1"/>
+          </a:fillRef>
+          <a:effectRef idx="0">
+            <a:schemeClr val="accent1"/>
+          </a:effectRef>
+          <a:fontRef idx="minor">
+            <a:schemeClr val="tx1"/>
+          </a:fontRef>
+        </p:style>
+      </p:cxnSp>
+      <p:cxnSp>
+        <p:nvCxnSpPr>
+          <p:cNvPr id="25" name="Straight Arrow Connector 24">
+            <a:extLst>
+              <a:ext uri="{FF2B5EF4-FFF2-40B4-BE49-F238E27FC236}">
+                <a16:creationId xmlns:a16="http://schemas.microsoft.com/office/drawing/2014/main" id="{6CF87166-E9C2-6F97-280E-060BAAE8062A}"/>
+              </a:ext>
+            </a:extLst>
+          </p:cNvPr>
+          <p:cNvCxnSpPr>
+            <a:stCxn id="12" idx="2"/>
+            <a:endCxn id="46" idx="2"/>
+          </p:cNvCxnSpPr>
+          <p:nvPr/>
+        </p:nvCxnSpPr>
+        <p:spPr>
+          <a:xfrm flipH="1">
+            <a:off x="6302150" y="1847114"/>
+            <a:ext cx="261348" cy="300129"/>
+          </a:xfrm>
+          <a:prstGeom prst="straightConnector1">
+            <a:avLst/>
+          </a:prstGeom>
+          <a:ln>
+            <a:tailEnd type="triangle"/>
+          </a:ln>
+        </p:spPr>
+        <p:style>
+          <a:lnRef idx="1">
+            <a:schemeClr val="accent1"/>
+          </a:lnRef>
+          <a:fillRef idx="0">
+            <a:schemeClr val="accent1"/>
+          </a:fillRef>
+          <a:effectRef idx="0">
+            <a:schemeClr val="accent1"/>
+          </a:effectRef>
+          <a:fontRef idx="minor">
+            <a:schemeClr val="tx1"/>
+          </a:fontRef>
+        </p:style>
+      </p:cxnSp>
+      <p:cxnSp>
+        <p:nvCxnSpPr>
+          <p:cNvPr id="28" name="Straight Arrow Connector 27">
+            <a:extLst>
+              <a:ext uri="{FF2B5EF4-FFF2-40B4-BE49-F238E27FC236}">
+                <a16:creationId xmlns:a16="http://schemas.microsoft.com/office/drawing/2014/main" id="{7B0A21F9-8BA8-8A69-E2BD-50A2804C3A40}"/>
+              </a:ext>
+            </a:extLst>
+          </p:cNvPr>
+          <p:cNvCxnSpPr>
+            <a:stCxn id="11" idx="2"/>
+            <a:endCxn id="46" idx="1"/>
+          </p:cNvCxnSpPr>
+          <p:nvPr/>
+        </p:nvCxnSpPr>
+        <p:spPr>
+          <a:xfrm>
+            <a:off x="3672582" y="1694598"/>
+            <a:ext cx="352171" cy="459405"/>
           </a:xfrm>
           <a:prstGeom prst="straightConnector1">
             <a:avLst/>
@@ -4138,21 +4753,20 @@
           <p:cNvPr id="30" name="Straight Arrow Connector 29">
             <a:extLst>
               <a:ext uri="{FF2B5EF4-FFF2-40B4-BE49-F238E27FC236}">
-                <a16:creationId xmlns:a16="http://schemas.microsoft.com/office/drawing/2014/main" id="{5B57DE88-C672-B3AE-77D1-CCC47F6B12AD}"/>
+                <a16:creationId xmlns:a16="http://schemas.microsoft.com/office/drawing/2014/main" id="{BE947DB2-6A67-E64F-24F4-73B702FE3258}"/>
               </a:ext>
             </a:extLst>
           </p:cNvPr>
           <p:cNvCxnSpPr>
-            <a:cxnSpLocks/>
-            <a:stCxn id="19" idx="2"/>
-            <a:endCxn id="10" idx="0"/>
+            <a:stCxn id="46" idx="5"/>
+            <a:endCxn id="20" idx="0"/>
           </p:cNvCxnSpPr>
           <p:nvPr/>
         </p:nvCxnSpPr>
         <p:spPr>
-          <a:xfrm>
-            <a:off x="6529176" y="1593352"/>
-            <a:ext cx="4069" cy="286026"/>
+          <a:xfrm flipH="1">
+            <a:off x="5057843" y="2491989"/>
+            <a:ext cx="117347" cy="266567"/>
           </a:xfrm>
           <a:prstGeom prst="straightConnector1">
             <a:avLst/>
@@ -4178,210 +4792,26 @@
       </p:cxnSp>
       <p:cxnSp>
         <p:nvCxnSpPr>
-          <p:cNvPr id="32" name="Straight Arrow Connector 31">
-            <a:extLst>
-              <a:ext uri="{FF2B5EF4-FFF2-40B4-BE49-F238E27FC236}">
-                <a16:creationId xmlns:a16="http://schemas.microsoft.com/office/drawing/2014/main" id="{2FBD84D2-4F76-623A-947E-4DA442A226F8}"/>
+          <p:cNvPr id="39" name="Straight Arrow Connector 38">
+            <a:extLst>
+              <a:ext uri="{FF2B5EF4-FFF2-40B4-BE49-F238E27FC236}">
+                <a16:creationId xmlns:a16="http://schemas.microsoft.com/office/drawing/2014/main" id="{CA2159F5-5EA3-2E44-2397-47A0222DB06F}"/>
               </a:ext>
             </a:extLst>
           </p:cNvPr>
           <p:cNvCxnSpPr>
             <a:cxnSpLocks/>
-            <a:stCxn id="8" idx="1"/>
-            <a:endCxn id="15" idx="3"/>
+            <a:stCxn id="20" idx="3"/>
+            <a:endCxn id="10" idx="1"/>
           </p:cNvCxnSpPr>
           <p:nvPr/>
         </p:nvCxnSpPr>
         <p:spPr>
-          <a:xfrm flipH="1" flipV="1">
-            <a:off x="3684108" y="3975199"/>
-            <a:ext cx="1114679" cy="1"/>
+          <a:xfrm flipV="1">
+            <a:off x="7424188" y="2912444"/>
+            <a:ext cx="381820" cy="1"/>
           </a:xfrm>
           <a:prstGeom prst="straightConnector1">
-            <a:avLst/>
-          </a:prstGeom>
-          <a:ln>
-            <a:headEnd type="triangle"/>
-            <a:tailEnd type="triangle"/>
-          </a:ln>
-        </p:spPr>
-        <p:style>
-          <a:lnRef idx="1">
-            <a:schemeClr val="accent1"/>
-          </a:lnRef>
-          <a:fillRef idx="0">
-            <a:schemeClr val="accent1"/>
-          </a:fillRef>
-          <a:effectRef idx="0">
-            <a:schemeClr val="accent1"/>
-          </a:effectRef>
-          <a:fontRef idx="minor">
-            <a:schemeClr val="tx1"/>
-          </a:fontRef>
-        </p:style>
-      </p:cxnSp>
-      <p:sp>
-        <p:nvSpPr>
-          <p:cNvPr id="34" name="Rectangle 33">
-            <a:extLst>
-              <a:ext uri="{FF2B5EF4-FFF2-40B4-BE49-F238E27FC236}">
-                <a16:creationId xmlns:a16="http://schemas.microsoft.com/office/drawing/2014/main" id="{DDA0AE39-E2FF-A2B4-DC84-D8D5BB67AA55}"/>
-              </a:ext>
-            </a:extLst>
-          </p:cNvPr>
-          <p:cNvSpPr/>
-          <p:nvPr/>
-        </p:nvSpPr>
-        <p:spPr>
-          <a:xfrm>
-            <a:off x="10158245" y="3121223"/>
-            <a:ext cx="1133856" cy="461665"/>
-          </a:xfrm>
-          <a:prstGeom prst="rect">
-            <a:avLst/>
-          </a:prstGeom>
-        </p:spPr>
-        <p:style>
-          <a:lnRef idx="2">
-            <a:schemeClr val="accent2">
-              <a:shade val="50000"/>
-            </a:schemeClr>
-          </a:lnRef>
-          <a:fillRef idx="1">
-            <a:schemeClr val="accent2"/>
-          </a:fillRef>
-          <a:effectRef idx="0">
-            <a:schemeClr val="accent2"/>
-          </a:effectRef>
-          <a:fontRef idx="minor">
-            <a:schemeClr val="lt1"/>
-          </a:fontRef>
-        </p:style>
-        <p:txBody>
-          <a:bodyPr rtlCol="0" anchor="ctr"/>
-          <a:lstStyle/>
-          <a:p>
-            <a:pPr algn="ctr"/>
-            <a:r>
-              <a:rPr lang="en-US" sz="1400" dirty="0" err="1"/>
-              <a:t>STLink</a:t>
-            </a:r>
-            <a:endParaRPr lang="en-US" sz="1400" dirty="0"/>
-          </a:p>
-        </p:txBody>
-      </p:sp>
-      <p:cxnSp>
-        <p:nvCxnSpPr>
-          <p:cNvPr id="42" name="Straight Arrow Connector 41">
-            <a:extLst>
-              <a:ext uri="{FF2B5EF4-FFF2-40B4-BE49-F238E27FC236}">
-                <a16:creationId xmlns:a16="http://schemas.microsoft.com/office/drawing/2014/main" id="{10E9BB97-A0A0-B87B-2288-E0C901C53057}"/>
-              </a:ext>
-            </a:extLst>
-          </p:cNvPr>
-          <p:cNvCxnSpPr>
-            <a:stCxn id="8" idx="0"/>
-            <a:endCxn id="9" idx="2"/>
-          </p:cNvCxnSpPr>
-          <p:nvPr/>
-        </p:nvCxnSpPr>
-        <p:spPr>
-          <a:xfrm flipV="1">
-            <a:off x="5571455" y="2898620"/>
-            <a:ext cx="0" cy="610796"/>
-          </a:xfrm>
-          <a:prstGeom prst="straightConnector1">
-            <a:avLst/>
-          </a:prstGeom>
-          <a:ln>
-            <a:tailEnd type="triangle"/>
-          </a:ln>
-        </p:spPr>
-        <p:style>
-          <a:lnRef idx="1">
-            <a:schemeClr val="accent1"/>
-          </a:lnRef>
-          <a:fillRef idx="0">
-            <a:schemeClr val="accent1"/>
-          </a:fillRef>
-          <a:effectRef idx="0">
-            <a:schemeClr val="accent1"/>
-          </a:effectRef>
-          <a:fontRef idx="minor">
-            <a:schemeClr val="tx1"/>
-          </a:fontRef>
-        </p:style>
-      </p:cxnSp>
-      <p:sp>
-        <p:nvSpPr>
-          <p:cNvPr id="43" name="Rectangle 42">
-            <a:extLst>
-              <a:ext uri="{FF2B5EF4-FFF2-40B4-BE49-F238E27FC236}">
-                <a16:creationId xmlns:a16="http://schemas.microsoft.com/office/drawing/2014/main" id="{B7DBF298-8D3D-7DF7-EE21-7A272E5ED15A}"/>
-              </a:ext>
-            </a:extLst>
-          </p:cNvPr>
-          <p:cNvSpPr/>
-          <p:nvPr/>
-        </p:nvSpPr>
-        <p:spPr>
-          <a:xfrm>
-            <a:off x="10158245" y="4039873"/>
-            <a:ext cx="1133856" cy="721484"/>
-          </a:xfrm>
-          <a:prstGeom prst="rect">
-            <a:avLst/>
-          </a:prstGeom>
-        </p:spPr>
-        <p:style>
-          <a:lnRef idx="2">
-            <a:schemeClr val="accent2">
-              <a:shade val="50000"/>
-            </a:schemeClr>
-          </a:lnRef>
-          <a:fillRef idx="1">
-            <a:schemeClr val="accent2"/>
-          </a:fillRef>
-          <a:effectRef idx="0">
-            <a:schemeClr val="accent2"/>
-          </a:effectRef>
-          <a:fontRef idx="minor">
-            <a:schemeClr val="lt1"/>
-          </a:fontRef>
-        </p:style>
-        <p:txBody>
-          <a:bodyPr rtlCol="0" anchor="ctr"/>
-          <a:lstStyle/>
-          <a:p>
-            <a:pPr algn="ctr"/>
-            <a:r>
-              <a:rPr lang="en-US" sz="1400" dirty="0"/>
-              <a:t>Personal Computer</a:t>
-            </a:r>
-          </a:p>
-        </p:txBody>
-      </p:sp>
-      <p:cxnSp>
-        <p:nvCxnSpPr>
-          <p:cNvPr id="45" name="Connector: Elbow 44">
-            <a:extLst>
-              <a:ext uri="{FF2B5EF4-FFF2-40B4-BE49-F238E27FC236}">
-                <a16:creationId xmlns:a16="http://schemas.microsoft.com/office/drawing/2014/main" id="{3B98DBCA-7D5F-878A-D169-E6155ED71846}"/>
-              </a:ext>
-            </a:extLst>
-          </p:cNvPr>
-          <p:cNvCxnSpPr>
-            <a:stCxn id="34" idx="1"/>
-            <a:endCxn id="8" idx="3"/>
-          </p:cNvCxnSpPr>
-          <p:nvPr/>
-        </p:nvCxnSpPr>
-        <p:spPr>
-          <a:xfrm rot="10800000" flipV="1">
-            <a:off x="6344123" y="3352056"/>
-            <a:ext cx="3814122" cy="623144"/>
-          </a:xfrm>
-          <a:prstGeom prst="bentConnector3">
             <a:avLst/>
           </a:prstGeom>
           <a:ln>
@@ -4405,30 +4835,29 @@
       </p:cxnSp>
       <p:cxnSp>
         <p:nvCxnSpPr>
-          <p:cNvPr id="47" name="Connector: Elbow 46">
-            <a:extLst>
-              <a:ext uri="{FF2B5EF4-FFF2-40B4-BE49-F238E27FC236}">
-                <a16:creationId xmlns:a16="http://schemas.microsoft.com/office/drawing/2014/main" id="{947C23AB-674C-C882-CDF2-453BE0D1066D}"/>
+          <p:cNvPr id="41" name="Straight Arrow Connector 40">
+            <a:extLst>
+              <a:ext uri="{FF2B5EF4-FFF2-40B4-BE49-F238E27FC236}">
+                <a16:creationId xmlns:a16="http://schemas.microsoft.com/office/drawing/2014/main" id="{BB0E72BE-31BC-CA6F-10FE-479F96112BCB}"/>
               </a:ext>
             </a:extLst>
           </p:cNvPr>
           <p:cNvCxnSpPr>
             <a:cxnSpLocks/>
-            <a:stCxn id="43" idx="1"/>
-            <a:endCxn id="8" idx="3"/>
+            <a:stCxn id="20" idx="2"/>
+            <a:endCxn id="8" idx="1"/>
           </p:cNvCxnSpPr>
           <p:nvPr/>
         </p:nvCxnSpPr>
         <p:spPr>
-          <a:xfrm rot="10800000">
-            <a:off x="6344123" y="3975201"/>
-            <a:ext cx="3814122" cy="425415"/>
-          </a:xfrm>
-          <a:prstGeom prst="bentConnector3">
+          <a:xfrm>
+            <a:off x="5057843" y="3066333"/>
+            <a:ext cx="71941" cy="472394"/>
+          </a:xfrm>
+          <a:prstGeom prst="straightConnector1">
             <a:avLst/>
           </a:prstGeom>
           <a:ln>
-            <a:prstDash val="dash"/>
             <a:tailEnd type="triangle"/>
           </a:ln>
         </p:spPr>
@@ -4449,10 +4878,10 @@
       </p:cxnSp>
       <p:sp>
         <p:nvSpPr>
-          <p:cNvPr id="49" name="TextBox 48">
-            <a:extLst>
-              <a:ext uri="{FF2B5EF4-FFF2-40B4-BE49-F238E27FC236}">
-                <a16:creationId xmlns:a16="http://schemas.microsoft.com/office/drawing/2014/main" id="{457ED3F2-6C69-CAFE-3B12-65F0E9F9D7FE}"/>
+          <p:cNvPr id="57" name="TextBox 56">
+            <a:extLst>
+              <a:ext uri="{FF2B5EF4-FFF2-40B4-BE49-F238E27FC236}">
+                <a16:creationId xmlns:a16="http://schemas.microsoft.com/office/drawing/2014/main" id="{1DA9E4B6-25B7-13FC-BD37-06AD2A6D1D95}"/>
               </a:ext>
             </a:extLst>
           </p:cNvPr>
@@ -4461,8 +4890,8 @@
         </p:nvSpPr>
         <p:spPr>
           <a:xfrm>
-            <a:off x="9024389" y="4137223"/>
-            <a:ext cx="1031794" cy="523220"/>
+            <a:off x="6733788" y="3897864"/>
+            <a:ext cx="700284" cy="276999"/>
           </a:xfrm>
           <a:prstGeom prst="rect">
             <a:avLst/>
@@ -4476,24 +4905,60 @@
           <a:lstStyle/>
           <a:p>
             <a:r>
-              <a:rPr lang="en-US" sz="1400" dirty="0"/>
-              <a:t>USB</a:t>
-            </a:r>
-          </a:p>
-          <a:p>
-            <a:r>
-              <a:rPr lang="en-US" sz="1400" dirty="0"/>
-              <a:t>(Tentative)</a:t>
-            </a:r>
-          </a:p>
-        </p:txBody>
-      </p:sp>
-      <p:sp>
-        <p:nvSpPr>
-          <p:cNvPr id="50" name="TextBox 49">
-            <a:extLst>
-              <a:ext uri="{FF2B5EF4-FFF2-40B4-BE49-F238E27FC236}">
-                <a16:creationId xmlns:a16="http://schemas.microsoft.com/office/drawing/2014/main" id="{E6ABDEA6-1093-8D9B-E7D1-EDB0D5CA5EF7}"/>
+              <a:rPr lang="en-US" sz="1200" dirty="0"/>
+              <a:t>SWD</a:t>
+            </a:r>
+          </a:p>
+        </p:txBody>
+      </p:sp>
+      <p:cxnSp>
+        <p:nvCxnSpPr>
+          <p:cNvPr id="60" name="Straight Arrow Connector 59">
+            <a:extLst>
+              <a:ext uri="{FF2B5EF4-FFF2-40B4-BE49-F238E27FC236}">
+                <a16:creationId xmlns:a16="http://schemas.microsoft.com/office/drawing/2014/main" id="{C1C86C5B-1D22-A1C7-8F49-A867E3752E1C}"/>
+              </a:ext>
+            </a:extLst>
+          </p:cNvPr>
+          <p:cNvCxnSpPr>
+            <a:stCxn id="34" idx="1"/>
+            <a:endCxn id="8" idx="3"/>
+          </p:cNvCxnSpPr>
+          <p:nvPr/>
+        </p:nvCxnSpPr>
+        <p:spPr>
+          <a:xfrm flipH="1">
+            <a:off x="6080760" y="4151513"/>
+            <a:ext cx="1251943" cy="9006"/>
+          </a:xfrm>
+          <a:prstGeom prst="straightConnector1">
+            <a:avLst/>
+          </a:prstGeom>
+          <a:ln>
+            <a:tailEnd type="triangle"/>
+          </a:ln>
+        </p:spPr>
+        <p:style>
+          <a:lnRef idx="1">
+            <a:schemeClr val="accent1"/>
+          </a:lnRef>
+          <a:fillRef idx="0">
+            <a:schemeClr val="accent1"/>
+          </a:fillRef>
+          <a:effectRef idx="0">
+            <a:schemeClr val="accent1"/>
+          </a:effectRef>
+          <a:fontRef idx="minor">
+            <a:schemeClr val="tx1"/>
+          </a:fontRef>
+        </p:style>
+      </p:cxnSp>
+      <p:sp>
+        <p:nvSpPr>
+          <p:cNvPr id="64" name="TextBox 63">
+            <a:extLst>
+              <a:ext uri="{FF2B5EF4-FFF2-40B4-BE49-F238E27FC236}">
+                <a16:creationId xmlns:a16="http://schemas.microsoft.com/office/drawing/2014/main" id="{94280842-90F0-8811-5795-072941D2D22E}"/>
               </a:ext>
             </a:extLst>
           </p:cNvPr>
@@ -4502,8 +4967,8 @@
         </p:nvSpPr>
         <p:spPr>
           <a:xfrm>
-            <a:off x="9055492" y="3059771"/>
-            <a:ext cx="815548" cy="307777"/>
+            <a:off x="3871927" y="5149167"/>
+            <a:ext cx="904456" cy="276999"/>
           </a:xfrm>
           <a:prstGeom prst="rect">
             <a:avLst/>
@@ -4517,471 +4982,31 @@
           <a:lstStyle/>
           <a:p>
             <a:r>
-              <a:rPr lang="en-US" sz="1400" dirty="0"/>
-              <a:t>SWD</a:t>
-            </a:r>
-          </a:p>
-        </p:txBody>
-      </p:sp>
-      <p:sp>
-        <p:nvSpPr>
-          <p:cNvPr id="51" name="TextBox 50">
-            <a:extLst>
-              <a:ext uri="{FF2B5EF4-FFF2-40B4-BE49-F238E27FC236}">
-                <a16:creationId xmlns:a16="http://schemas.microsoft.com/office/drawing/2014/main" id="{E1320415-9973-8AD7-C107-CFC1CFA63FEB}"/>
-              </a:ext>
-            </a:extLst>
-          </p:cNvPr>
-          <p:cNvSpPr txBox="1"/>
-          <p:nvPr/>
-        </p:nvSpPr>
-        <p:spPr>
-          <a:xfrm>
-            <a:off x="5687464" y="4660443"/>
-            <a:ext cx="3362231" cy="307777"/>
-          </a:xfrm>
-          <a:prstGeom prst="rect">
-            <a:avLst/>
-          </a:prstGeom>
-          <a:noFill/>
-        </p:spPr>
-        <p:txBody>
-          <a:bodyPr wrap="square" rtlCol="0">
-            <a:spAutoFit/>
-          </a:bodyPr>
-          <a:lstStyle/>
-          <a:p>
-            <a:r>
-              <a:rPr lang="en-US" sz="1400" dirty="0"/>
-              <a:t>ADC * Number of Photo Resistors</a:t>
-            </a:r>
-          </a:p>
-        </p:txBody>
-      </p:sp>
-      <p:sp>
-        <p:nvSpPr>
-          <p:cNvPr id="52" name="TextBox 51">
-            <a:extLst>
-              <a:ext uri="{FF2B5EF4-FFF2-40B4-BE49-F238E27FC236}">
-                <a16:creationId xmlns:a16="http://schemas.microsoft.com/office/drawing/2014/main" id="{42B81EEB-B010-4FF1-F60B-1E920253E8EB}"/>
-              </a:ext>
-            </a:extLst>
-          </p:cNvPr>
-          <p:cNvSpPr txBox="1"/>
-          <p:nvPr/>
-        </p:nvSpPr>
-        <p:spPr>
-          <a:xfrm>
-            <a:off x="5592502" y="3056628"/>
-            <a:ext cx="815548" cy="307777"/>
-          </a:xfrm>
-          <a:prstGeom prst="rect">
-            <a:avLst/>
-          </a:prstGeom>
-          <a:noFill/>
-        </p:spPr>
-        <p:txBody>
-          <a:bodyPr wrap="square" rtlCol="0">
-            <a:spAutoFit/>
-          </a:bodyPr>
-          <a:lstStyle/>
-          <a:p>
-            <a:r>
-              <a:rPr lang="en-US" sz="1400" dirty="0"/>
+              <a:rPr lang="en-US" sz="1200" dirty="0"/>
               <a:t>GPIO</a:t>
-            </a:r>
-          </a:p>
-        </p:txBody>
-      </p:sp>
-      <p:sp>
-        <p:nvSpPr>
-          <p:cNvPr id="54" name="TextBox 53">
-            <a:extLst>
-              <a:ext uri="{FF2B5EF4-FFF2-40B4-BE49-F238E27FC236}">
-                <a16:creationId xmlns:a16="http://schemas.microsoft.com/office/drawing/2014/main" id="{906F0092-A40D-2B55-F1A9-2B09F7BF6F37}"/>
-              </a:ext>
-            </a:extLst>
-          </p:cNvPr>
-          <p:cNvSpPr txBox="1"/>
-          <p:nvPr/>
-        </p:nvSpPr>
-        <p:spPr>
-          <a:xfrm>
-            <a:off x="3894016" y="3660209"/>
-            <a:ext cx="815548" cy="307777"/>
-          </a:xfrm>
-          <a:prstGeom prst="rect">
-            <a:avLst/>
-          </a:prstGeom>
-          <a:noFill/>
-        </p:spPr>
-        <p:txBody>
-          <a:bodyPr wrap="square" rtlCol="0">
-            <a:spAutoFit/>
-          </a:bodyPr>
-          <a:lstStyle/>
-          <a:p>
-            <a:r>
-              <a:rPr lang="en-US" sz="1400" dirty="0"/>
-              <a:t>I2C</a:t>
-            </a:r>
-          </a:p>
-        </p:txBody>
-      </p:sp>
-      <p:sp>
-        <p:nvSpPr>
-          <p:cNvPr id="11" name="TextBox 10">
-            <a:extLst>
-              <a:ext uri="{FF2B5EF4-FFF2-40B4-BE49-F238E27FC236}">
-                <a16:creationId xmlns:a16="http://schemas.microsoft.com/office/drawing/2014/main" id="{4FDE725B-35D5-42A7-0E72-38274B0F66A8}"/>
-              </a:ext>
-            </a:extLst>
-          </p:cNvPr>
-          <p:cNvSpPr txBox="1"/>
-          <p:nvPr/>
-        </p:nvSpPr>
-        <p:spPr>
-          <a:xfrm>
-            <a:off x="3742627" y="5955937"/>
-            <a:ext cx="4075321" cy="307777"/>
-          </a:xfrm>
-          <a:prstGeom prst="rect">
-            <a:avLst/>
-          </a:prstGeom>
-          <a:noFill/>
-        </p:spPr>
-        <p:txBody>
-          <a:bodyPr wrap="square" rtlCol="0">
-            <a:spAutoFit/>
-          </a:bodyPr>
-          <a:lstStyle/>
-          <a:p>
-            <a:r>
-              <a:rPr lang="en-US" sz="1400" dirty="0">
-                <a:hlinkClick r:id="rId2"/>
-              </a:rPr>
-              <a:t>Mini Photocell - SEN-09088 - </a:t>
-            </a:r>
-            <a:r>
-              <a:rPr lang="en-US" sz="1400" dirty="0" err="1">
-                <a:hlinkClick r:id="rId2"/>
-              </a:rPr>
-              <a:t>SparkFun</a:t>
-            </a:r>
-            <a:r>
-              <a:rPr lang="en-US" sz="1400" dirty="0">
-                <a:hlinkClick r:id="rId2"/>
-              </a:rPr>
-              <a:t> Electronics</a:t>
-            </a:r>
-            <a:endParaRPr lang="en-US" sz="1400" dirty="0"/>
-          </a:p>
-        </p:txBody>
-      </p:sp>
-      <p:sp>
-        <p:nvSpPr>
-          <p:cNvPr id="12" name="TextBox 11">
-            <a:extLst>
-              <a:ext uri="{FF2B5EF4-FFF2-40B4-BE49-F238E27FC236}">
-                <a16:creationId xmlns:a16="http://schemas.microsoft.com/office/drawing/2014/main" id="{9657F4CE-6791-900C-3C9F-481DCAFDC22D}"/>
-              </a:ext>
-            </a:extLst>
-          </p:cNvPr>
-          <p:cNvSpPr txBox="1"/>
-          <p:nvPr/>
-        </p:nvSpPr>
-        <p:spPr>
-          <a:xfrm>
-            <a:off x="4614267" y="5655310"/>
-            <a:ext cx="1976572" cy="307777"/>
-          </a:xfrm>
-          <a:prstGeom prst="rect">
-            <a:avLst/>
-          </a:prstGeom>
-          <a:noFill/>
-        </p:spPr>
-        <p:txBody>
-          <a:bodyPr wrap="square" rtlCol="0">
-            <a:spAutoFit/>
-          </a:bodyPr>
-          <a:lstStyle/>
-          <a:p>
-            <a:r>
-              <a:rPr lang="en-US" sz="1400" dirty="0"/>
-              <a:t>SEN-09088 (or similar)</a:t>
-            </a:r>
-          </a:p>
-        </p:txBody>
-      </p:sp>
-      <p:sp>
-        <p:nvSpPr>
-          <p:cNvPr id="14" name="TextBox 13">
-            <a:extLst>
-              <a:ext uri="{FF2B5EF4-FFF2-40B4-BE49-F238E27FC236}">
-                <a16:creationId xmlns:a16="http://schemas.microsoft.com/office/drawing/2014/main" id="{7D87B7D7-990B-BFF3-D152-9B2C2843298B}"/>
-              </a:ext>
-            </a:extLst>
-          </p:cNvPr>
-          <p:cNvSpPr txBox="1"/>
-          <p:nvPr/>
-        </p:nvSpPr>
-        <p:spPr>
-          <a:xfrm>
-            <a:off x="6138383" y="2535783"/>
-            <a:ext cx="2033399" cy="461665"/>
-          </a:xfrm>
-          <a:prstGeom prst="rect">
-            <a:avLst/>
-          </a:prstGeom>
-          <a:noFill/>
-        </p:spPr>
-        <p:txBody>
-          <a:bodyPr wrap="square" rtlCol="0">
-            <a:spAutoFit/>
-          </a:bodyPr>
-          <a:lstStyle/>
-          <a:p>
-            <a:r>
-              <a:rPr lang="en-US" sz="1200" dirty="0" err="1"/>
-              <a:t>Everlight</a:t>
-            </a:r>
-            <a:r>
-              <a:rPr lang="en-US" sz="1200" dirty="0"/>
-              <a:t> Elec (Blue)</a:t>
-            </a:r>
-          </a:p>
-          <a:p>
-            <a:r>
-              <a:rPr lang="en-US" sz="1200" dirty="0"/>
-              <a:t>19-217/BHC-ZL1M2RY/3T</a:t>
-            </a:r>
-          </a:p>
-        </p:txBody>
-      </p:sp>
-      <p:sp>
-        <p:nvSpPr>
-          <p:cNvPr id="16" name="TextBox 15">
-            <a:extLst>
-              <a:ext uri="{FF2B5EF4-FFF2-40B4-BE49-F238E27FC236}">
-                <a16:creationId xmlns:a16="http://schemas.microsoft.com/office/drawing/2014/main" id="{989C3470-8579-482A-E0D9-34D2C27FDDF9}"/>
-              </a:ext>
-            </a:extLst>
-          </p:cNvPr>
-          <p:cNvSpPr txBox="1"/>
-          <p:nvPr/>
-        </p:nvSpPr>
-        <p:spPr>
-          <a:xfrm>
-            <a:off x="7096104" y="1793781"/>
-            <a:ext cx="2033399" cy="461665"/>
-          </a:xfrm>
-          <a:prstGeom prst="rect">
-            <a:avLst/>
-          </a:prstGeom>
-          <a:noFill/>
-        </p:spPr>
-        <p:txBody>
-          <a:bodyPr wrap="square" rtlCol="0">
-            <a:spAutoFit/>
-          </a:bodyPr>
-          <a:lstStyle/>
-          <a:p>
-            <a:r>
-              <a:rPr lang="en-US" sz="1200" dirty="0" err="1"/>
-              <a:t>Everlight</a:t>
-            </a:r>
-            <a:r>
-              <a:rPr lang="en-US" sz="1200" dirty="0"/>
-              <a:t> Elec (Green)</a:t>
-            </a:r>
-          </a:p>
-          <a:p>
-            <a:r>
-              <a:rPr lang="en-US" sz="1200" dirty="0"/>
-              <a:t>19-217/BHC-ZL1M2RY/3T</a:t>
-            </a:r>
-          </a:p>
-        </p:txBody>
-      </p:sp>
-      <p:sp>
-        <p:nvSpPr>
-          <p:cNvPr id="21" name="TextBox 20">
-            <a:extLst>
-              <a:ext uri="{FF2B5EF4-FFF2-40B4-BE49-F238E27FC236}">
-                <a16:creationId xmlns:a16="http://schemas.microsoft.com/office/drawing/2014/main" id="{7D2EB12D-590C-1F50-D84C-62F75B78FA6A}"/>
-              </a:ext>
-            </a:extLst>
-          </p:cNvPr>
-          <p:cNvSpPr txBox="1"/>
-          <p:nvPr/>
-        </p:nvSpPr>
-        <p:spPr>
-          <a:xfrm>
-            <a:off x="6473432" y="3429000"/>
-            <a:ext cx="1451441" cy="276999"/>
-          </a:xfrm>
-          <a:prstGeom prst="rect">
-            <a:avLst/>
-          </a:prstGeom>
-          <a:noFill/>
-        </p:spPr>
-        <p:txBody>
-          <a:bodyPr wrap="square" rtlCol="0">
-            <a:spAutoFit/>
-          </a:bodyPr>
-          <a:lstStyle/>
-          <a:p>
-            <a:r>
-              <a:rPr lang="en-US" sz="1200" dirty="0"/>
-              <a:t>STM32L431RCT6</a:t>
-            </a:r>
-          </a:p>
-        </p:txBody>
-      </p:sp>
-      <p:sp>
-        <p:nvSpPr>
-          <p:cNvPr id="33" name="TextBox 32">
-            <a:extLst>
-              <a:ext uri="{FF2B5EF4-FFF2-40B4-BE49-F238E27FC236}">
-                <a16:creationId xmlns:a16="http://schemas.microsoft.com/office/drawing/2014/main" id="{B811BE71-1EAA-E1C9-F2D6-E846B4D96E65}"/>
-              </a:ext>
-            </a:extLst>
-          </p:cNvPr>
-          <p:cNvSpPr txBox="1"/>
-          <p:nvPr/>
-        </p:nvSpPr>
-        <p:spPr>
-          <a:xfrm>
-            <a:off x="8607453" y="694858"/>
-            <a:ext cx="1415103" cy="276999"/>
-          </a:xfrm>
-          <a:prstGeom prst="rect">
-            <a:avLst/>
-          </a:prstGeom>
-          <a:noFill/>
-        </p:spPr>
-        <p:txBody>
-          <a:bodyPr wrap="square" rtlCol="0">
-            <a:spAutoFit/>
-          </a:bodyPr>
-          <a:lstStyle/>
-          <a:p>
-            <a:r>
-              <a:rPr lang="en-US" sz="1200" dirty="0"/>
-              <a:t>3V Coin Cell *2</a:t>
-            </a:r>
-          </a:p>
-        </p:txBody>
-      </p:sp>
-      <p:sp>
-        <p:nvSpPr>
-          <p:cNvPr id="35" name="TextBox 34">
-            <a:extLst>
-              <a:ext uri="{FF2B5EF4-FFF2-40B4-BE49-F238E27FC236}">
-                <a16:creationId xmlns:a16="http://schemas.microsoft.com/office/drawing/2014/main" id="{6FEAD58C-6F51-BEF7-BED3-F883C79340EB}"/>
-              </a:ext>
-            </a:extLst>
-          </p:cNvPr>
-          <p:cNvSpPr txBox="1"/>
-          <p:nvPr/>
-        </p:nvSpPr>
-        <p:spPr>
-          <a:xfrm>
-            <a:off x="7343866" y="1259122"/>
-            <a:ext cx="2527174" cy="461665"/>
-          </a:xfrm>
-          <a:prstGeom prst="rect">
-            <a:avLst/>
-          </a:prstGeom>
-          <a:noFill/>
-        </p:spPr>
-        <p:txBody>
-          <a:bodyPr wrap="square" rtlCol="0">
-            <a:spAutoFit/>
-          </a:bodyPr>
-          <a:lstStyle/>
-          <a:p>
-            <a:r>
-              <a:rPr lang="en-US" sz="1200" b="1" dirty="0"/>
-              <a:t>AP7380-33W5-7 (3.3)</a:t>
-            </a:r>
-          </a:p>
-          <a:p>
-            <a:r>
-              <a:rPr lang="en-US" sz="1200" dirty="0"/>
-              <a:t>AP7380-18W5-7 (1.8V Ideal)</a:t>
-            </a:r>
-          </a:p>
-        </p:txBody>
-      </p:sp>
-      <p:sp>
-        <p:nvSpPr>
-          <p:cNvPr id="46" name="Rectangle 45">
-            <a:extLst>
-              <a:ext uri="{FF2B5EF4-FFF2-40B4-BE49-F238E27FC236}">
-                <a16:creationId xmlns:a16="http://schemas.microsoft.com/office/drawing/2014/main" id="{342CB1D2-03B0-9DA2-199C-D7712CB1160A}"/>
-              </a:ext>
-            </a:extLst>
-          </p:cNvPr>
-          <p:cNvSpPr/>
-          <p:nvPr/>
-        </p:nvSpPr>
-        <p:spPr>
-          <a:xfrm>
-            <a:off x="5965755" y="687180"/>
-            <a:ext cx="1133856" cy="307777"/>
-          </a:xfrm>
-          <a:prstGeom prst="rect">
-            <a:avLst/>
-          </a:prstGeom>
-        </p:spPr>
-        <p:style>
-          <a:lnRef idx="2">
-            <a:schemeClr val="accent5">
-              <a:shade val="50000"/>
-            </a:schemeClr>
-          </a:lnRef>
-          <a:fillRef idx="1">
-            <a:schemeClr val="accent5"/>
-          </a:fillRef>
-          <a:effectRef idx="0">
-            <a:schemeClr val="accent5"/>
-          </a:effectRef>
-          <a:fontRef idx="minor">
-            <a:schemeClr val="lt1"/>
-          </a:fontRef>
-        </p:style>
-        <p:txBody>
-          <a:bodyPr rtlCol="0" anchor="ctr"/>
-          <a:lstStyle/>
-          <a:p>
-            <a:pPr algn="ctr"/>
-            <a:r>
-              <a:rPr lang="en-US" sz="1400" dirty="0"/>
-              <a:t>PWR Switch</a:t>
             </a:r>
           </a:p>
         </p:txBody>
       </p:sp>
       <p:cxnSp>
         <p:nvCxnSpPr>
-          <p:cNvPr id="55" name="Straight Arrow Connector 54">
-            <a:extLst>
-              <a:ext uri="{FF2B5EF4-FFF2-40B4-BE49-F238E27FC236}">
-                <a16:creationId xmlns:a16="http://schemas.microsoft.com/office/drawing/2014/main" id="{159B0DBA-F17A-78B9-453B-88A687ED965A}"/>
+          <p:cNvPr id="67" name="Straight Arrow Connector 66">
+            <a:extLst>
+              <a:ext uri="{FF2B5EF4-FFF2-40B4-BE49-F238E27FC236}">
+                <a16:creationId xmlns:a16="http://schemas.microsoft.com/office/drawing/2014/main" id="{274602E5-04E4-1166-5084-585748E6D587}"/>
               </a:ext>
             </a:extLst>
           </p:cNvPr>
           <p:cNvCxnSpPr>
-            <a:stCxn id="18" idx="1"/>
-            <a:endCxn id="46" idx="3"/>
+            <a:stCxn id="8" idx="5"/>
+            <a:endCxn id="15" idx="0"/>
           </p:cNvCxnSpPr>
           <p:nvPr/>
         </p:nvCxnSpPr>
         <p:spPr>
-          <a:xfrm flipH="1" flipV="1">
-            <a:off x="7099611" y="841069"/>
-            <a:ext cx="373986" cy="1941"/>
+          <a:xfrm>
+            <a:off x="5431536" y="4873751"/>
+            <a:ext cx="793427" cy="806677"/>
           </a:xfrm>
           <a:prstGeom prst="straightConnector1">
             <a:avLst/>
@@ -5007,23 +5032,23 @@
       </p:cxnSp>
       <p:cxnSp>
         <p:nvCxnSpPr>
-          <p:cNvPr id="57" name="Straight Arrow Connector 56">
-            <a:extLst>
-              <a:ext uri="{FF2B5EF4-FFF2-40B4-BE49-F238E27FC236}">
-                <a16:creationId xmlns:a16="http://schemas.microsoft.com/office/drawing/2014/main" id="{5FC7620B-EB16-D070-2164-3F2758037E41}"/>
+          <p:cNvPr id="69" name="Straight Arrow Connector 68">
+            <a:extLst>
+              <a:ext uri="{FF2B5EF4-FFF2-40B4-BE49-F238E27FC236}">
+                <a16:creationId xmlns:a16="http://schemas.microsoft.com/office/drawing/2014/main" id="{CD870416-D4B5-EA80-DFFF-F93BBA7EBAAA}"/>
               </a:ext>
             </a:extLst>
           </p:cNvPr>
           <p:cNvCxnSpPr>
-            <a:stCxn id="46" idx="2"/>
-            <a:endCxn id="19" idx="0"/>
+            <a:stCxn id="8" idx="6"/>
+            <a:endCxn id="13" idx="0"/>
           </p:cNvCxnSpPr>
           <p:nvPr/>
         </p:nvCxnSpPr>
         <p:spPr>
           <a:xfrm flipH="1">
-            <a:off x="6529176" y="994957"/>
-            <a:ext cx="3507" cy="290618"/>
+            <a:off x="4185576" y="4873752"/>
+            <a:ext cx="468720" cy="833745"/>
           </a:xfrm>
           <a:prstGeom prst="straightConnector1">
             <a:avLst/>
@@ -5049,72 +5074,58 @@
       </p:cxnSp>
       <p:sp>
         <p:nvSpPr>
-          <p:cNvPr id="38" name="Rectangle 37">
-            <a:extLst>
-              <a:ext uri="{FF2B5EF4-FFF2-40B4-BE49-F238E27FC236}">
-                <a16:creationId xmlns:a16="http://schemas.microsoft.com/office/drawing/2014/main" id="{22488619-CECC-EDBD-C43D-BDD08C1913D6}"/>
-              </a:ext>
-            </a:extLst>
-          </p:cNvPr>
-          <p:cNvSpPr/>
+          <p:cNvPr id="70" name="TextBox 69">
+            <a:extLst>
+              <a:ext uri="{FF2B5EF4-FFF2-40B4-BE49-F238E27FC236}">
+                <a16:creationId xmlns:a16="http://schemas.microsoft.com/office/drawing/2014/main" id="{EBA94575-CF7C-A25F-EFD4-20EFD37B1C33}"/>
+              </a:ext>
+            </a:extLst>
+          </p:cNvPr>
+          <p:cNvSpPr txBox="1"/>
           <p:nvPr/>
         </p:nvSpPr>
         <p:spPr>
           <a:xfrm>
-            <a:off x="3052255" y="2611756"/>
-            <a:ext cx="1380744" cy="307777"/>
+            <a:off x="5900021" y="5086640"/>
+            <a:ext cx="904456" cy="276999"/>
           </a:xfrm>
           <a:prstGeom prst="rect">
             <a:avLst/>
           </a:prstGeom>
-        </p:spPr>
-        <p:style>
-          <a:lnRef idx="2">
-            <a:schemeClr val="accent5">
-              <a:shade val="50000"/>
-            </a:schemeClr>
-          </a:lnRef>
-          <a:fillRef idx="1">
-            <a:schemeClr val="accent5"/>
-          </a:fillRef>
-          <a:effectRef idx="0">
-            <a:schemeClr val="accent5"/>
-          </a:effectRef>
-          <a:fontRef idx="minor">
-            <a:schemeClr val="lt1"/>
-          </a:fontRef>
-        </p:style>
-        <p:txBody>
-          <a:bodyPr rtlCol="0" anchor="ctr"/>
-          <a:lstStyle/>
-          <a:p>
-            <a:pPr algn="ctr"/>
-            <a:r>
-              <a:rPr lang="en-US" sz="1400" dirty="0"/>
-              <a:t>Switch (Reset)</a:t>
+          <a:noFill/>
+        </p:spPr>
+        <p:txBody>
+          <a:bodyPr wrap="square" rtlCol="0">
+            <a:spAutoFit/>
+          </a:bodyPr>
+          <a:lstStyle/>
+          <a:p>
+            <a:r>
+              <a:rPr lang="en-US" sz="1200" dirty="0"/>
+              <a:t>I2C</a:t>
             </a:r>
           </a:p>
         </p:txBody>
       </p:sp>
       <p:cxnSp>
         <p:nvCxnSpPr>
-          <p:cNvPr id="41" name="Straight Arrow Connector 40">
-            <a:extLst>
-              <a:ext uri="{FF2B5EF4-FFF2-40B4-BE49-F238E27FC236}">
-                <a16:creationId xmlns:a16="http://schemas.microsoft.com/office/drawing/2014/main" id="{4C80A62D-67F0-6180-580D-CB32E58E5A32}"/>
+          <p:cNvPr id="72" name="Straight Arrow Connector 71">
+            <a:extLst>
+              <a:ext uri="{FF2B5EF4-FFF2-40B4-BE49-F238E27FC236}">
+                <a16:creationId xmlns:a16="http://schemas.microsoft.com/office/drawing/2014/main" id="{46D0DD53-21BB-CC20-67C6-21D8B526EEFB}"/>
               </a:ext>
             </a:extLst>
           </p:cNvPr>
           <p:cNvCxnSpPr>
-            <a:stCxn id="38" idx="2"/>
-            <a:endCxn id="8" idx="0"/>
+            <a:stCxn id="38" idx="3"/>
+            <a:endCxn id="8" idx="8"/>
           </p:cNvCxnSpPr>
           <p:nvPr/>
         </p:nvCxnSpPr>
         <p:spPr>
           <a:xfrm>
-            <a:off x="3742627" y="2919533"/>
-            <a:ext cx="1828828" cy="589883"/>
+            <a:off x="2647188" y="4228057"/>
+            <a:ext cx="1412748" cy="23903"/>
           </a:xfrm>
           <a:prstGeom prst="straightConnector1">
             <a:avLst/>
@@ -5140,10 +5151,10 @@
       </p:cxnSp>
       <p:sp>
         <p:nvSpPr>
-          <p:cNvPr id="53" name="TextBox 52">
-            <a:extLst>
-              <a:ext uri="{FF2B5EF4-FFF2-40B4-BE49-F238E27FC236}">
-                <a16:creationId xmlns:a16="http://schemas.microsoft.com/office/drawing/2014/main" id="{7127FC22-31EC-E4D4-62EC-9C51C2D55726}"/>
+          <p:cNvPr id="73" name="TextBox 72">
+            <a:extLst>
+              <a:ext uri="{FF2B5EF4-FFF2-40B4-BE49-F238E27FC236}">
+                <a16:creationId xmlns:a16="http://schemas.microsoft.com/office/drawing/2014/main" id="{F6F65444-EE8A-B8FF-1A40-88C7C808386C}"/>
               </a:ext>
             </a:extLst>
           </p:cNvPr>
@@ -5152,8 +5163,8 @@
         </p:nvSpPr>
         <p:spPr>
           <a:xfrm>
-            <a:off x="9966960" y="517902"/>
-            <a:ext cx="2158141" cy="646331"/>
+            <a:off x="2850900" y="3939665"/>
+            <a:ext cx="1125315" cy="276999"/>
           </a:xfrm>
           <a:prstGeom prst="rect">
             <a:avLst/>
@@ -5168,42 +5179,7 @@
           <a:p>
             <a:r>
               <a:rPr lang="en-US" sz="1200" dirty="0"/>
-              <a:t>https://www.digikey.com/en/products/detail/keystone-electronics/1027/49724</a:t>
-            </a:r>
-          </a:p>
-        </p:txBody>
-      </p:sp>
-      <p:sp>
-        <p:nvSpPr>
-          <p:cNvPr id="56" name="TextBox 55">
-            <a:extLst>
-              <a:ext uri="{FF2B5EF4-FFF2-40B4-BE49-F238E27FC236}">
-                <a16:creationId xmlns:a16="http://schemas.microsoft.com/office/drawing/2014/main" id="{6B47D50C-8287-A04D-F08F-1DDF68AEBF49}"/>
-              </a:ext>
-            </a:extLst>
-          </p:cNvPr>
-          <p:cNvSpPr txBox="1"/>
-          <p:nvPr/>
-        </p:nvSpPr>
-        <p:spPr>
-          <a:xfrm>
-            <a:off x="2560965" y="4363055"/>
-            <a:ext cx="1440325" cy="276999"/>
-          </a:xfrm>
-          <a:prstGeom prst="rect">
-            <a:avLst/>
-          </a:prstGeom>
-          <a:noFill/>
-        </p:spPr>
-        <p:txBody>
-          <a:bodyPr wrap="square" rtlCol="0">
-            <a:spAutoFit/>
-          </a:bodyPr>
-          <a:lstStyle/>
-          <a:p>
-            <a:r>
-              <a:rPr lang="en-US" sz="1200" dirty="0"/>
-              <a:t>FM24V05-GTR</a:t>
+              <a:t>GPIO (NRST)</a:t>
             </a:r>
           </a:p>
         </p:txBody>

</xml_diff>

<commit_message>
Updating device tree architecture to be more simple and redundant
</commit_message>
<xml_diff>
--- a/design.pptx
+++ b/design.pptx
@@ -259,7 +259,7 @@
           <a:p>
             <a:fld id="{24FD6ABC-FBB2-4D10-81CB-3943CF222665}" type="datetimeFigureOut">
               <a:rPr lang="en-US" smtClean="0"/>
-              <a:t>3/23/2023</a:t>
+              <a:t>3/28/2023</a:t>
             </a:fld>
             <a:endParaRPr lang="en-US"/>
           </a:p>
@@ -457,7 +457,7 @@
           <a:p>
             <a:fld id="{24FD6ABC-FBB2-4D10-81CB-3943CF222665}" type="datetimeFigureOut">
               <a:rPr lang="en-US" smtClean="0"/>
-              <a:t>3/23/2023</a:t>
+              <a:t>3/28/2023</a:t>
             </a:fld>
             <a:endParaRPr lang="en-US"/>
           </a:p>
@@ -665,7 +665,7 @@
           <a:p>
             <a:fld id="{24FD6ABC-FBB2-4D10-81CB-3943CF222665}" type="datetimeFigureOut">
               <a:rPr lang="en-US" smtClean="0"/>
-              <a:t>3/23/2023</a:t>
+              <a:t>3/28/2023</a:t>
             </a:fld>
             <a:endParaRPr lang="en-US"/>
           </a:p>
@@ -863,7 +863,7 @@
           <a:p>
             <a:fld id="{24FD6ABC-FBB2-4D10-81CB-3943CF222665}" type="datetimeFigureOut">
               <a:rPr lang="en-US" smtClean="0"/>
-              <a:t>3/23/2023</a:t>
+              <a:t>3/28/2023</a:t>
             </a:fld>
             <a:endParaRPr lang="en-US"/>
           </a:p>
@@ -1138,7 +1138,7 @@
           <a:p>
             <a:fld id="{24FD6ABC-FBB2-4D10-81CB-3943CF222665}" type="datetimeFigureOut">
               <a:rPr lang="en-US" smtClean="0"/>
-              <a:t>3/23/2023</a:t>
+              <a:t>3/28/2023</a:t>
             </a:fld>
             <a:endParaRPr lang="en-US"/>
           </a:p>
@@ -1403,7 +1403,7 @@
           <a:p>
             <a:fld id="{24FD6ABC-FBB2-4D10-81CB-3943CF222665}" type="datetimeFigureOut">
               <a:rPr lang="en-US" smtClean="0"/>
-              <a:t>3/23/2023</a:t>
+              <a:t>3/28/2023</a:t>
             </a:fld>
             <a:endParaRPr lang="en-US"/>
           </a:p>
@@ -1815,7 +1815,7 @@
           <a:p>
             <a:fld id="{24FD6ABC-FBB2-4D10-81CB-3943CF222665}" type="datetimeFigureOut">
               <a:rPr lang="en-US" smtClean="0"/>
-              <a:t>3/23/2023</a:t>
+              <a:t>3/28/2023</a:t>
             </a:fld>
             <a:endParaRPr lang="en-US"/>
           </a:p>
@@ -1956,7 +1956,7 @@
           <a:p>
             <a:fld id="{24FD6ABC-FBB2-4D10-81CB-3943CF222665}" type="datetimeFigureOut">
               <a:rPr lang="en-US" smtClean="0"/>
-              <a:t>3/23/2023</a:t>
+              <a:t>3/28/2023</a:t>
             </a:fld>
             <a:endParaRPr lang="en-US"/>
           </a:p>
@@ -2069,7 +2069,7 @@
           <a:p>
             <a:fld id="{24FD6ABC-FBB2-4D10-81CB-3943CF222665}" type="datetimeFigureOut">
               <a:rPr lang="en-US" smtClean="0"/>
-              <a:t>3/23/2023</a:t>
+              <a:t>3/28/2023</a:t>
             </a:fld>
             <a:endParaRPr lang="en-US"/>
           </a:p>
@@ -2380,7 +2380,7 @@
           <a:p>
             <a:fld id="{24FD6ABC-FBB2-4D10-81CB-3943CF222665}" type="datetimeFigureOut">
               <a:rPr lang="en-US" smtClean="0"/>
-              <a:t>3/23/2023</a:t>
+              <a:t>3/28/2023</a:t>
             </a:fld>
             <a:endParaRPr lang="en-US"/>
           </a:p>
@@ -2668,7 +2668,7 @@
           <a:p>
             <a:fld id="{24FD6ABC-FBB2-4D10-81CB-3943CF222665}" type="datetimeFigureOut">
               <a:rPr lang="en-US" smtClean="0"/>
-              <a:t>3/23/2023</a:t>
+              <a:t>3/28/2023</a:t>
             </a:fld>
             <a:endParaRPr lang="en-US"/>
           </a:p>
@@ -2909,7 +2909,7 @@
           <a:p>
             <a:fld id="{24FD6ABC-FBB2-4D10-81CB-3943CF222665}" type="datetimeFigureOut">
               <a:rPr lang="en-US" smtClean="0"/>
-              <a:t>3/23/2023</a:t>
+              <a:t>3/28/2023</a:t>
             </a:fld>
             <a:endParaRPr lang="en-US"/>
           </a:p>
@@ -3355,7 +3355,7 @@
           <a:lstStyle/>
           <a:p>
             <a:r>
-              <a:rPr lang="en-US" dirty="0"/>
+              <a:rPr lang="en-US" b="1" dirty="0"/>
               <a:t>v1.0 – Device Tree</a:t>
             </a:r>
           </a:p>
@@ -3827,7 +3827,7 @@
         </p:nvSpPr>
         <p:spPr>
           <a:xfrm>
-            <a:off x="7806008" y="2758555"/>
+            <a:off x="8034478" y="2772810"/>
             <a:ext cx="1694495" cy="307777"/>
           </a:xfrm>
           <a:prstGeom prst="rect">
@@ -3981,7 +3981,7 @@
         </p:nvSpPr>
         <p:spPr>
           <a:xfrm>
-            <a:off x="2701382" y="787001"/>
+            <a:off x="2929852" y="801256"/>
             <a:ext cx="1942401" cy="307778"/>
           </a:xfrm>
           <a:prstGeom prst="rect">
@@ -4030,7 +4030,7 @@
         </p:nvSpPr>
         <p:spPr>
           <a:xfrm>
-            <a:off x="2691497" y="2758556"/>
+            <a:off x="2919967" y="2772811"/>
             <a:ext cx="4732691" cy="307777"/>
           </a:xfrm>
           <a:prstGeom prst="rect">
@@ -4079,7 +4079,7 @@
         </p:nvSpPr>
         <p:spPr>
           <a:xfrm>
-            <a:off x="7332703" y="3912095"/>
+            <a:off x="8567143" y="3935445"/>
             <a:ext cx="2212109" cy="478835"/>
           </a:xfrm>
           <a:prstGeom prst="rect">
@@ -4136,7 +4136,7 @@
         </p:nvSpPr>
         <p:spPr>
           <a:xfrm>
-            <a:off x="5702806" y="243541"/>
+            <a:off x="5931276" y="257796"/>
             <a:ext cx="3163905" cy="478835"/>
           </a:xfrm>
           <a:prstGeom prst="rect">
@@ -4185,7 +4185,7 @@
         </p:nvSpPr>
         <p:spPr>
           <a:xfrm>
-            <a:off x="2701381" y="2147243"/>
+            <a:off x="2929851" y="2161498"/>
             <a:ext cx="4732691" cy="346340"/>
           </a:xfrm>
           <a:custGeom>
@@ -4394,7 +4394,7 @@
         </p:nvSpPr>
         <p:spPr>
           <a:xfrm>
-            <a:off x="5702808" y="787002"/>
+            <a:off x="5931278" y="801257"/>
             <a:ext cx="1731264" cy="307777"/>
           </a:xfrm>
           <a:prstGeom prst="rect">
@@ -4443,8 +4443,8 @@
         </p:nvSpPr>
         <p:spPr>
           <a:xfrm>
-            <a:off x="2701381" y="1386821"/>
-            <a:ext cx="1942401" cy="307777"/>
+            <a:off x="2929851" y="1327753"/>
+            <a:ext cx="1942401" cy="470703"/>
           </a:xfrm>
           <a:prstGeom prst="rect">
             <a:avLst/>
@@ -4473,7 +4473,7 @@
             <a:pPr algn="ctr"/>
             <a:r>
               <a:rPr lang="en-US" sz="1400" dirty="0"/>
-              <a:t>Buck Regulator (3V)</a:t>
+              <a:t>Low Dropout Regulator (3.3V)</a:t>
             </a:r>
           </a:p>
         </p:txBody>
@@ -4492,7 +4492,7 @@
         </p:nvSpPr>
         <p:spPr>
           <a:xfrm>
-            <a:off x="5702807" y="1378614"/>
+            <a:off x="5931277" y="1392869"/>
             <a:ext cx="1721381" cy="468500"/>
           </a:xfrm>
           <a:prstGeom prst="rect">
@@ -4522,7 +4522,7 @@
             <a:pPr algn="ctr"/>
             <a:r>
               <a:rPr lang="en-US" sz="1400" dirty="0"/>
-              <a:t>Low Dropout Regulator (3V)</a:t>
+              <a:t>Low Dropout Regulator (3.3V)</a:t>
             </a:r>
           </a:p>
         </p:txBody>
@@ -4541,7 +4541,7 @@
         </p:nvSpPr>
         <p:spPr>
           <a:xfrm>
-            <a:off x="7424189" y="787002"/>
+            <a:off x="7652659" y="801257"/>
             <a:ext cx="1442523" cy="307777"/>
           </a:xfrm>
           <a:prstGeom prst="rect">
@@ -4589,6 +4589,7 @@
             </a:extLst>
           </p:cNvPr>
           <p:cNvCxnSpPr>
+            <a:cxnSpLocks/>
             <a:stCxn id="18" idx="2"/>
             <a:endCxn id="11" idx="0"/>
           </p:cNvCxnSpPr>
@@ -4596,8 +4597,8 @@
         </p:nvCxnSpPr>
         <p:spPr>
           <a:xfrm flipH="1">
-            <a:off x="3672582" y="1094779"/>
-            <a:ext cx="1" cy="292042"/>
+            <a:off x="3901052" y="1109034"/>
+            <a:ext cx="1" cy="218719"/>
           </a:xfrm>
           <a:prstGeom prst="straightConnector1">
             <a:avLst/>
@@ -4639,7 +4640,7 @@
         </p:nvCxnSpPr>
         <p:spPr>
           <a:xfrm flipH="1">
-            <a:off x="6563498" y="1094779"/>
+            <a:off x="6791968" y="1109034"/>
             <a:ext cx="4942" cy="283835"/>
           </a:xfrm>
           <a:prstGeom prst="straightConnector1">
@@ -4681,7 +4682,7 @@
         </p:nvCxnSpPr>
         <p:spPr>
           <a:xfrm flipH="1">
-            <a:off x="6302150" y="1847114"/>
+            <a:off x="6530620" y="1861369"/>
             <a:ext cx="261348" cy="300129"/>
           </a:xfrm>
           <a:prstGeom prst="straightConnector1">
@@ -4716,6 +4717,7 @@
             </a:extLst>
           </p:cNvPr>
           <p:cNvCxnSpPr>
+            <a:cxnSpLocks/>
             <a:stCxn id="11" idx="2"/>
             <a:endCxn id="46" idx="1"/>
           </p:cNvCxnSpPr>
@@ -4723,8 +4725,8 @@
         </p:nvCxnSpPr>
         <p:spPr>
           <a:xfrm>
-            <a:off x="3672582" y="1694598"/>
-            <a:ext cx="352171" cy="459405"/>
+            <a:off x="3901052" y="1798456"/>
+            <a:ext cx="352171" cy="369802"/>
           </a:xfrm>
           <a:prstGeom prst="straightConnector1">
             <a:avLst/>
@@ -4765,7 +4767,7 @@
         </p:nvCxnSpPr>
         <p:spPr>
           <a:xfrm flipH="1">
-            <a:off x="5057843" y="2491989"/>
+            <a:off x="5286313" y="2506244"/>
             <a:ext cx="117347" cy="266567"/>
           </a:xfrm>
           <a:prstGeom prst="straightConnector1">
@@ -4808,7 +4810,7 @@
         </p:nvCxnSpPr>
         <p:spPr>
           <a:xfrm flipV="1">
-            <a:off x="7424188" y="2912444"/>
+            <a:off x="7652658" y="2926699"/>
             <a:ext cx="381820" cy="1"/>
           </a:xfrm>
           <a:prstGeom prst="straightConnector1">
@@ -4850,9 +4852,9 @@
           <p:nvPr/>
         </p:nvCxnSpPr>
         <p:spPr>
-          <a:xfrm>
-            <a:off x="5057843" y="3066333"/>
-            <a:ext cx="71941" cy="472394"/>
+          <a:xfrm flipH="1">
+            <a:off x="5129784" y="3080588"/>
+            <a:ext cx="156529" cy="458139"/>
           </a:xfrm>
           <a:prstGeom prst="straightConnector1">
             <a:avLst/>
@@ -4890,7 +4892,7 @@
         </p:nvSpPr>
         <p:spPr>
           <a:xfrm>
-            <a:off x="6733788" y="3897864"/>
+            <a:off x="7838516" y="3897863"/>
             <a:ext cx="700284" cy="276999"/>
           </a:xfrm>
           <a:prstGeom prst="rect">
@@ -4927,9 +4929,9 @@
           <p:nvPr/>
         </p:nvCxnSpPr>
         <p:spPr>
-          <a:xfrm flipH="1">
-            <a:off x="6080760" y="4151513"/>
-            <a:ext cx="1251943" cy="9006"/>
+          <a:xfrm flipH="1" flipV="1">
+            <a:off x="6080760" y="4160519"/>
+            <a:ext cx="2486383" cy="14344"/>
           </a:xfrm>
           <a:prstGeom prst="straightConnector1">
             <a:avLst/>
@@ -5184,6 +5186,427 @@
           </a:p>
         </p:txBody>
       </p:sp>
+      <p:sp>
+        <p:nvSpPr>
+          <p:cNvPr id="24" name="Rectangle 23">
+            <a:extLst>
+              <a:ext uri="{FF2B5EF4-FFF2-40B4-BE49-F238E27FC236}">
+                <a16:creationId xmlns:a16="http://schemas.microsoft.com/office/drawing/2014/main" id="{B18692A0-038F-634D-95A2-483CFF449B27}"/>
+              </a:ext>
+            </a:extLst>
+          </p:cNvPr>
+          <p:cNvSpPr/>
+          <p:nvPr/>
+        </p:nvSpPr>
+        <p:spPr>
+          <a:xfrm>
+            <a:off x="2940365" y="441438"/>
+            <a:ext cx="1942401" cy="307778"/>
+          </a:xfrm>
+          <a:prstGeom prst="rect">
+            <a:avLst/>
+          </a:prstGeom>
+        </p:spPr>
+        <p:style>
+          <a:lnRef idx="2">
+            <a:schemeClr val="accent4">
+              <a:shade val="50000"/>
+            </a:schemeClr>
+          </a:lnRef>
+          <a:fillRef idx="1">
+            <a:schemeClr val="accent4"/>
+          </a:fillRef>
+          <a:effectRef idx="0">
+            <a:schemeClr val="accent4"/>
+          </a:effectRef>
+          <a:fontRef idx="minor">
+            <a:schemeClr val="lt1"/>
+          </a:fontRef>
+        </p:style>
+        <p:txBody>
+          <a:bodyPr rtlCol="0" anchor="ctr"/>
+          <a:lstStyle/>
+          <a:p>
+            <a:pPr algn="ctr"/>
+            <a:r>
+              <a:rPr lang="en-US" sz="1400" dirty="0"/>
+              <a:t>Coin Cell Battery (3V)</a:t>
+            </a:r>
+          </a:p>
+        </p:txBody>
+      </p:sp>
+      <p:sp>
+        <p:nvSpPr>
+          <p:cNvPr id="26" name="Rectangle 25">
+            <a:extLst>
+              <a:ext uri="{FF2B5EF4-FFF2-40B4-BE49-F238E27FC236}">
+                <a16:creationId xmlns:a16="http://schemas.microsoft.com/office/drawing/2014/main" id="{4338E557-11DE-7D9D-F708-2B3537338DE0}"/>
+              </a:ext>
+            </a:extLst>
+          </p:cNvPr>
+          <p:cNvSpPr/>
+          <p:nvPr/>
+        </p:nvSpPr>
+        <p:spPr>
+          <a:xfrm>
+            <a:off x="952693" y="5152268"/>
+            <a:ext cx="1694495" cy="307777"/>
+          </a:xfrm>
+          <a:prstGeom prst="rect">
+            <a:avLst/>
+          </a:prstGeom>
+        </p:spPr>
+        <p:style>
+          <a:lnRef idx="2">
+            <a:schemeClr val="accent5">
+              <a:shade val="50000"/>
+            </a:schemeClr>
+          </a:lnRef>
+          <a:fillRef idx="1">
+            <a:schemeClr val="accent5"/>
+          </a:fillRef>
+          <a:effectRef idx="0">
+            <a:schemeClr val="accent5"/>
+          </a:effectRef>
+          <a:fontRef idx="minor">
+            <a:schemeClr val="lt1"/>
+          </a:fontRef>
+        </p:style>
+        <p:txBody>
+          <a:bodyPr rtlCol="0" anchor="ctr"/>
+          <a:lstStyle/>
+          <a:p>
+            <a:pPr algn="ctr"/>
+            <a:r>
+              <a:rPr lang="en-US" sz="1400" dirty="0"/>
+              <a:t>Status LED (Blue)</a:t>
+            </a:r>
+          </a:p>
+        </p:txBody>
+      </p:sp>
+      <p:cxnSp>
+        <p:nvCxnSpPr>
+          <p:cNvPr id="29" name="Straight Arrow Connector 28">
+            <a:extLst>
+              <a:ext uri="{FF2B5EF4-FFF2-40B4-BE49-F238E27FC236}">
+                <a16:creationId xmlns:a16="http://schemas.microsoft.com/office/drawing/2014/main" id="{FD34BC2F-CDD7-9C27-10AA-1DEE5D8B649C}"/>
+              </a:ext>
+            </a:extLst>
+          </p:cNvPr>
+          <p:cNvCxnSpPr>
+            <a:stCxn id="8" idx="7"/>
+            <a:endCxn id="26" idx="3"/>
+          </p:cNvCxnSpPr>
+          <p:nvPr/>
+        </p:nvCxnSpPr>
+        <p:spPr>
+          <a:xfrm flipH="1">
+            <a:off x="2647188" y="4865649"/>
+            <a:ext cx="1433036" cy="440508"/>
+          </a:xfrm>
+          <a:prstGeom prst="straightConnector1">
+            <a:avLst/>
+          </a:prstGeom>
+          <a:ln>
+            <a:tailEnd type="triangle"/>
+          </a:ln>
+        </p:spPr>
+        <p:style>
+          <a:lnRef idx="1">
+            <a:schemeClr val="accent1"/>
+          </a:lnRef>
+          <a:fillRef idx="0">
+            <a:schemeClr val="accent1"/>
+          </a:fillRef>
+          <a:effectRef idx="0">
+            <a:schemeClr val="accent1"/>
+          </a:effectRef>
+          <a:fontRef idx="minor">
+            <a:schemeClr val="tx1"/>
+          </a:fontRef>
+        </p:style>
+      </p:cxnSp>
+      <p:sp>
+        <p:nvSpPr>
+          <p:cNvPr id="31" name="Rectangle 30">
+            <a:extLst>
+              <a:ext uri="{FF2B5EF4-FFF2-40B4-BE49-F238E27FC236}">
+                <a16:creationId xmlns:a16="http://schemas.microsoft.com/office/drawing/2014/main" id="{ABC0C45D-6B69-0450-1C66-DFBA33D05677}"/>
+              </a:ext>
+            </a:extLst>
+          </p:cNvPr>
+          <p:cNvSpPr/>
+          <p:nvPr/>
+        </p:nvSpPr>
+        <p:spPr>
+          <a:xfrm>
+            <a:off x="8567143" y="4985721"/>
+            <a:ext cx="2212109" cy="601263"/>
+          </a:xfrm>
+          <a:prstGeom prst="rect">
+            <a:avLst/>
+          </a:prstGeom>
+        </p:spPr>
+        <p:style>
+          <a:lnRef idx="2">
+            <a:schemeClr val="accent2">
+              <a:shade val="50000"/>
+            </a:schemeClr>
+          </a:lnRef>
+          <a:fillRef idx="1">
+            <a:schemeClr val="accent2"/>
+          </a:fillRef>
+          <a:effectRef idx="0">
+            <a:schemeClr val="accent2"/>
+          </a:effectRef>
+          <a:fontRef idx="minor">
+            <a:schemeClr val="lt1"/>
+          </a:fontRef>
+        </p:style>
+        <p:txBody>
+          <a:bodyPr rtlCol="0" anchor="ctr"/>
+          <a:lstStyle/>
+          <a:p>
+            <a:pPr algn="ctr"/>
+            <a:r>
+              <a:rPr lang="en-US" sz="1400" dirty="0"/>
+              <a:t>I2C Communication</a:t>
+            </a:r>
+          </a:p>
+          <a:p>
+            <a:pPr algn="ctr"/>
+            <a:r>
+              <a:rPr lang="en-US" sz="1400" dirty="0"/>
+              <a:t>(Redundant)</a:t>
+            </a:r>
+          </a:p>
+        </p:txBody>
+      </p:sp>
+      <p:cxnSp>
+        <p:nvCxnSpPr>
+          <p:cNvPr id="35" name="Straight Arrow Connector 34">
+            <a:extLst>
+              <a:ext uri="{FF2B5EF4-FFF2-40B4-BE49-F238E27FC236}">
+                <a16:creationId xmlns:a16="http://schemas.microsoft.com/office/drawing/2014/main" id="{77ED070D-1AF8-03C0-FEF7-654F003D126B}"/>
+              </a:ext>
+            </a:extLst>
+          </p:cNvPr>
+          <p:cNvCxnSpPr>
+            <a:stCxn id="31" idx="1"/>
+            <a:endCxn id="8" idx="4"/>
+          </p:cNvCxnSpPr>
+          <p:nvPr/>
+        </p:nvCxnSpPr>
+        <p:spPr>
+          <a:xfrm flipH="1" flipV="1">
+            <a:off x="6079646" y="4865649"/>
+            <a:ext cx="2487497" cy="420704"/>
+          </a:xfrm>
+          <a:prstGeom prst="straightConnector1">
+            <a:avLst/>
+          </a:prstGeom>
+          <a:ln>
+            <a:headEnd type="triangle"/>
+            <a:tailEnd type="triangle"/>
+          </a:ln>
+        </p:spPr>
+        <p:style>
+          <a:lnRef idx="1">
+            <a:schemeClr val="accent1"/>
+          </a:lnRef>
+          <a:fillRef idx="0">
+            <a:schemeClr val="accent1"/>
+          </a:fillRef>
+          <a:effectRef idx="0">
+            <a:schemeClr val="accent1"/>
+          </a:effectRef>
+          <a:fontRef idx="minor">
+            <a:schemeClr val="tx1"/>
+          </a:fontRef>
+        </p:style>
+      </p:cxnSp>
+      <p:sp>
+        <p:nvSpPr>
+          <p:cNvPr id="36" name="TextBox 35">
+            <a:extLst>
+              <a:ext uri="{FF2B5EF4-FFF2-40B4-BE49-F238E27FC236}">
+                <a16:creationId xmlns:a16="http://schemas.microsoft.com/office/drawing/2014/main" id="{A82739D0-04DE-CEF7-46F6-C30DDCEF7AE7}"/>
+              </a:ext>
+            </a:extLst>
+          </p:cNvPr>
+          <p:cNvSpPr txBox="1"/>
+          <p:nvPr/>
+        </p:nvSpPr>
+        <p:spPr>
+          <a:xfrm>
+            <a:off x="7519899" y="4799002"/>
+            <a:ext cx="700284" cy="276999"/>
+          </a:xfrm>
+          <a:prstGeom prst="rect">
+            <a:avLst/>
+          </a:prstGeom>
+          <a:noFill/>
+        </p:spPr>
+        <p:txBody>
+          <a:bodyPr wrap="square" rtlCol="0">
+            <a:spAutoFit/>
+          </a:bodyPr>
+          <a:lstStyle/>
+          <a:p>
+            <a:r>
+              <a:rPr lang="en-US" sz="1200" dirty="0"/>
+              <a:t>I2C</a:t>
+            </a:r>
+          </a:p>
+        </p:txBody>
+      </p:sp>
+      <p:sp>
+        <p:nvSpPr>
+          <p:cNvPr id="37" name="TextBox 36">
+            <a:extLst>
+              <a:ext uri="{FF2B5EF4-FFF2-40B4-BE49-F238E27FC236}">
+                <a16:creationId xmlns:a16="http://schemas.microsoft.com/office/drawing/2014/main" id="{2182ED27-B9A9-5E98-825D-8845E507AA1E}"/>
+              </a:ext>
+            </a:extLst>
+          </p:cNvPr>
+          <p:cNvSpPr txBox="1"/>
+          <p:nvPr/>
+        </p:nvSpPr>
+        <p:spPr>
+          <a:xfrm>
+            <a:off x="8567143" y="5680428"/>
+            <a:ext cx="2240452" cy="461665"/>
+          </a:xfrm>
+          <a:prstGeom prst="rect">
+            <a:avLst/>
+          </a:prstGeom>
+          <a:noFill/>
+        </p:spPr>
+        <p:txBody>
+          <a:bodyPr wrap="square" rtlCol="0">
+            <a:spAutoFit/>
+          </a:bodyPr>
+          <a:lstStyle/>
+          <a:p>
+            <a:r>
+              <a:rPr lang="en-US" sz="1200" dirty="0"/>
+              <a:t>Just in case USB communication does not work for data retrieval</a:t>
+            </a:r>
+          </a:p>
+        </p:txBody>
+      </p:sp>
+      <p:sp>
+        <p:nvSpPr>
+          <p:cNvPr id="40" name="TextBox 39">
+            <a:extLst>
+              <a:ext uri="{FF2B5EF4-FFF2-40B4-BE49-F238E27FC236}">
+                <a16:creationId xmlns:a16="http://schemas.microsoft.com/office/drawing/2014/main" id="{155FBC6B-1E5E-1301-0E23-35E78E5D74E5}"/>
+              </a:ext>
+            </a:extLst>
+          </p:cNvPr>
+          <p:cNvSpPr txBox="1"/>
+          <p:nvPr/>
+        </p:nvSpPr>
+        <p:spPr>
+          <a:xfrm>
+            <a:off x="2934160" y="4865649"/>
+            <a:ext cx="904456" cy="276999"/>
+          </a:xfrm>
+          <a:prstGeom prst="rect">
+            <a:avLst/>
+          </a:prstGeom>
+          <a:noFill/>
+        </p:spPr>
+        <p:txBody>
+          <a:bodyPr wrap="square" rtlCol="0">
+            <a:spAutoFit/>
+          </a:bodyPr>
+          <a:lstStyle/>
+          <a:p>
+            <a:r>
+              <a:rPr lang="en-US" sz="1200" dirty="0"/>
+              <a:t>GPIO</a:t>
+            </a:r>
+          </a:p>
+        </p:txBody>
+      </p:sp>
+      <p:sp>
+        <p:nvSpPr>
+          <p:cNvPr id="42" name="TextBox 41">
+            <a:extLst>
+              <a:ext uri="{FF2B5EF4-FFF2-40B4-BE49-F238E27FC236}">
+                <a16:creationId xmlns:a16="http://schemas.microsoft.com/office/drawing/2014/main" id="{B23BE242-A681-BA85-9786-A4A521191A7C}"/>
+              </a:ext>
+            </a:extLst>
+          </p:cNvPr>
+          <p:cNvSpPr txBox="1"/>
+          <p:nvPr/>
+        </p:nvSpPr>
+        <p:spPr>
+          <a:xfrm>
+            <a:off x="1689482" y="782269"/>
+            <a:ext cx="1412748" cy="830997"/>
+          </a:xfrm>
+          <a:prstGeom prst="rect">
+            <a:avLst/>
+          </a:prstGeom>
+          <a:noFill/>
+        </p:spPr>
+        <p:txBody>
+          <a:bodyPr wrap="square" rtlCol="0">
+            <a:spAutoFit/>
+          </a:bodyPr>
+          <a:lstStyle/>
+          <a:p>
+            <a:r>
+              <a:rPr lang="en-US" sz="1200" dirty="0"/>
+              <a:t>Starting simple, work up to buck regulator in next iteration</a:t>
+            </a:r>
+          </a:p>
+        </p:txBody>
+      </p:sp>
+      <p:cxnSp>
+        <p:nvCxnSpPr>
+          <p:cNvPr id="47" name="Connector: Elbow 46">
+            <a:extLst>
+              <a:ext uri="{FF2B5EF4-FFF2-40B4-BE49-F238E27FC236}">
+                <a16:creationId xmlns:a16="http://schemas.microsoft.com/office/drawing/2014/main" id="{9AE1A738-DC22-8A11-92D6-ABF62C4DCC91}"/>
+              </a:ext>
+            </a:extLst>
+          </p:cNvPr>
+          <p:cNvCxnSpPr>
+            <a:stCxn id="14" idx="2"/>
+            <a:endCxn id="8" idx="2"/>
+          </p:cNvCxnSpPr>
+          <p:nvPr/>
+        </p:nvCxnSpPr>
+        <p:spPr>
+          <a:xfrm rot="5400000">
+            <a:off x="6002736" y="1185945"/>
+            <a:ext cx="2448096" cy="2294275"/>
+          </a:xfrm>
+          <a:prstGeom prst="bentConnector2">
+            <a:avLst/>
+          </a:prstGeom>
+          <a:ln>
+            <a:tailEnd type="triangle"/>
+          </a:ln>
+        </p:spPr>
+        <p:style>
+          <a:lnRef idx="1">
+            <a:schemeClr val="accent1"/>
+          </a:lnRef>
+          <a:fillRef idx="0">
+            <a:schemeClr val="accent1"/>
+          </a:fillRef>
+          <a:effectRef idx="0">
+            <a:schemeClr val="accent1"/>
+          </a:effectRef>
+          <a:fontRef idx="minor">
+            <a:schemeClr val="tx1"/>
+          </a:fontRef>
+        </p:style>
+      </p:cxnSp>
     </p:spTree>
     <p:extLst>
       <p:ext uri="{BB962C8B-B14F-4D97-AF65-F5344CB8AC3E}">

</xml_diff>